<commit_message>
Arquitectura (vista de alto nivel)
</commit_message>
<xml_diff>
--- a/Tareas/JPPF/JPPF-Presentacion.pptx
+++ b/Tareas/JPPF/JPPF-Presentacion.pptx
@@ -2,17 +2,19 @@
 <file path=ppt/presentation.xml><?xml version="1.0" encoding="utf-8"?>
 <p:presentation xmlns:a="http://schemas.openxmlformats.org/drawingml/2006/main" xmlns:r="http://schemas.openxmlformats.org/officeDocument/2006/relationships" xmlns:p="http://schemas.openxmlformats.org/presentationml/2006/main" saveSubsetFonts="1">
   <p:sldMasterIdLst>
-    <p:sldMasterId id="2147483648" r:id="rId1"/>
+    <p:sldMasterId id="2147483672" r:id="rId1"/>
   </p:sldMasterIdLst>
   <p:sldIdLst>
     <p:sldId id="256" r:id="rId2"/>
     <p:sldId id="257" r:id="rId3"/>
-    <p:sldId id="258" r:id="rId4"/>
-    <p:sldId id="259" r:id="rId5"/>
-    <p:sldId id="260" r:id="rId6"/>
-    <p:sldId id="261" r:id="rId7"/>
-    <p:sldId id="262" r:id="rId8"/>
-    <p:sldId id="263" r:id="rId9"/>
+    <p:sldId id="264" r:id="rId4"/>
+    <p:sldId id="258" r:id="rId5"/>
+    <p:sldId id="265" r:id="rId6"/>
+    <p:sldId id="259" r:id="rId7"/>
+    <p:sldId id="260" r:id="rId8"/>
+    <p:sldId id="261" r:id="rId9"/>
+    <p:sldId id="262" r:id="rId10"/>
+    <p:sldId id="263" r:id="rId11"/>
   </p:sldIdLst>
   <p:sldSz cx="9144000" cy="6858000" type="screen4x3"/>
   <p:notesSz cx="6858000" cy="9144000"/>
@@ -133,7 +135,7 @@
       </p:grpSpPr>
       <p:sp>
         <p:nvSpPr>
-          <p:cNvPr id="2" name="1 Título"/>
+          <p:cNvPr id="2" name="Title 1"/>
           <p:cNvSpPr>
             <a:spLocks noGrp="1"/>
           </p:cNvSpPr>
@@ -143,25 +145,31 @@
         </p:nvSpPr>
         <p:spPr>
           <a:xfrm>
-            <a:off x="685800" y="2130425"/>
-            <a:ext cx="7772400" cy="1470025"/>
+            <a:off x="685800" y="1371600"/>
+            <a:ext cx="7848600" cy="1927225"/>
           </a:xfrm>
         </p:spPr>
         <p:txBody>
-          <a:bodyPr/>
-          <a:lstStyle/>
+          <a:bodyPr anchor="b">
+            <a:noAutofit/>
+          </a:bodyPr>
+          <a:lstStyle>
+            <a:lvl1pPr>
+              <a:defRPr sz="5400" cap="all" baseline="0"/>
+            </a:lvl1pPr>
+          </a:lstStyle>
           <a:p>
             <a:r>
               <a:rPr lang="es-ES" smtClean="0"/>
               <a:t>Haga clic para modificar el estilo de título del patrón</a:t>
             </a:r>
-            <a:endParaRPr lang="es-MX"/>
-          </a:p>
-        </p:txBody>
-      </p:sp>
-      <p:sp>
-        <p:nvSpPr>
-          <p:cNvPr id="3" name="2 Subtítulo"/>
+            <a:endParaRPr lang="en-US" dirty="0"/>
+          </a:p>
+        </p:txBody>
+      </p:sp>
+      <p:sp>
+        <p:nvSpPr>
+          <p:cNvPr id="3" name="Subtitle 2"/>
           <p:cNvSpPr>
             <a:spLocks noGrp="1"/>
           </p:cNvSpPr>
@@ -171,19 +179,20 @@
         </p:nvSpPr>
         <p:spPr>
           <a:xfrm>
-            <a:off x="1371600" y="3886200"/>
+            <a:off x="685800" y="3505200"/>
             <a:ext cx="6400800" cy="1752600"/>
           </a:xfrm>
         </p:spPr>
         <p:txBody>
           <a:bodyPr/>
           <a:lstStyle>
-            <a:lvl1pPr marL="0" indent="0" algn="ctr">
+            <a:lvl1pPr marL="0" indent="0" algn="l">
               <a:buNone/>
               <a:defRPr>
                 <a:solidFill>
                   <a:schemeClr val="tx1">
-                    <a:tint val="75000"/>
+                    <a:lumMod val="75000"/>
+                    <a:lumOff val="25000"/>
                   </a:schemeClr>
                 </a:solidFill>
               </a:defRPr>
@@ -274,13 +283,13 @@
               <a:rPr lang="es-ES" smtClean="0"/>
               <a:t>Haga clic para modificar el estilo de subtítulo del patrón</a:t>
             </a:r>
-            <a:endParaRPr lang="es-MX"/>
-          </a:p>
-        </p:txBody>
-      </p:sp>
-      <p:sp>
-        <p:nvSpPr>
-          <p:cNvPr id="4" name="3 Marcador de fecha"/>
+            <a:endParaRPr lang="en-US" dirty="0"/>
+          </a:p>
+        </p:txBody>
+      </p:sp>
+      <p:sp>
+        <p:nvSpPr>
+          <p:cNvPr id="4" name="Date Placeholder 3"/>
           <p:cNvSpPr>
             <a:spLocks noGrp="1"/>
           </p:cNvSpPr>
@@ -303,7 +312,7 @@
       </p:sp>
       <p:sp>
         <p:nvSpPr>
-          <p:cNvPr id="5" name="4 Marcador de pie de página"/>
+          <p:cNvPr id="5" name="Footer Placeholder 4"/>
           <p:cNvSpPr>
             <a:spLocks noGrp="1"/>
           </p:cNvSpPr>
@@ -322,7 +331,7 @@
       </p:sp>
       <p:sp>
         <p:nvSpPr>
-          <p:cNvPr id="6" name="5 Marcador de número de diapositiva"/>
+          <p:cNvPr id="6" name="Slide Number Placeholder 5"/>
           <p:cNvSpPr>
             <a:spLocks noGrp="1"/>
           </p:cNvSpPr>
@@ -343,12 +352,42 @@
           </a:p>
         </p:txBody>
       </p:sp>
+      <p:cxnSp>
+        <p:nvCxnSpPr>
+          <p:cNvPr id="8" name="Straight Connector 7"/>
+          <p:cNvCxnSpPr/>
+          <p:nvPr/>
+        </p:nvCxnSpPr>
+        <p:spPr>
+          <a:xfrm>
+            <a:off x="685800" y="3398520"/>
+            <a:ext cx="7848600" cy="1588"/>
+          </a:xfrm>
+          <a:prstGeom prst="line">
+            <a:avLst/>
+          </a:prstGeom>
+          <a:ln w="19050">
+            <a:solidFill>
+              <a:schemeClr val="tx2"/>
+            </a:solidFill>
+          </a:ln>
+        </p:spPr>
+        <p:style>
+          <a:lnRef idx="1">
+            <a:schemeClr val="accent1"/>
+          </a:lnRef>
+          <a:fillRef idx="0">
+            <a:schemeClr val="accent1"/>
+          </a:fillRef>
+          <a:effectRef idx="0">
+            <a:schemeClr val="accent1"/>
+          </a:effectRef>
+          <a:fontRef idx="minor">
+            <a:schemeClr val="tx1"/>
+          </a:fontRef>
+        </p:style>
+      </p:cxnSp>
     </p:spTree>
-    <p:extLst>
-      <p:ext uri="{BB962C8B-B14F-4D97-AF65-F5344CB8AC3E}">
-        <p14:creationId xmlns:p14="http://schemas.microsoft.com/office/powerpoint/2010/main" val="2042849689"/>
-      </p:ext>
-    </p:extLst>
   </p:cSld>
   <p:clrMapOvr>
     <a:masterClrMapping/>
@@ -375,7 +414,7 @@
       </p:grpSpPr>
       <p:sp>
         <p:nvSpPr>
-          <p:cNvPr id="2" name="1 Título"/>
+          <p:cNvPr id="2" name="Title 1"/>
           <p:cNvSpPr>
             <a:spLocks noGrp="1"/>
           </p:cNvSpPr>
@@ -392,13 +431,13 @@
               <a:rPr lang="es-ES" smtClean="0"/>
               <a:t>Haga clic para modificar el estilo de título del patrón</a:t>
             </a:r>
-            <a:endParaRPr lang="es-MX"/>
-          </a:p>
-        </p:txBody>
-      </p:sp>
-      <p:sp>
-        <p:nvSpPr>
-          <p:cNvPr id="3" name="2 Marcador de texto vertical"/>
+            <a:endParaRPr lang="en-US"/>
+          </a:p>
+        </p:txBody>
+      </p:sp>
+      <p:sp>
+        <p:nvSpPr>
+          <p:cNvPr id="3" name="Vertical Text Placeholder 2"/>
           <p:cNvSpPr>
             <a:spLocks noGrp="1"/>
           </p:cNvSpPr>
@@ -444,13 +483,13 @@
               <a:rPr lang="es-ES" smtClean="0"/>
               <a:t>Quinto nivel</a:t>
             </a:r>
-            <a:endParaRPr lang="es-MX"/>
-          </a:p>
-        </p:txBody>
-      </p:sp>
-      <p:sp>
-        <p:nvSpPr>
-          <p:cNvPr id="4" name="3 Marcador de fecha"/>
+            <a:endParaRPr lang="en-US"/>
+          </a:p>
+        </p:txBody>
+      </p:sp>
+      <p:sp>
+        <p:nvSpPr>
+          <p:cNvPr id="4" name="Date Placeholder 3"/>
           <p:cNvSpPr>
             <a:spLocks noGrp="1"/>
           </p:cNvSpPr>
@@ -473,7 +512,7 @@
       </p:sp>
       <p:sp>
         <p:nvSpPr>
-          <p:cNvPr id="5" name="4 Marcador de pie de página"/>
+          <p:cNvPr id="5" name="Footer Placeholder 4"/>
           <p:cNvSpPr>
             <a:spLocks noGrp="1"/>
           </p:cNvSpPr>
@@ -492,7 +531,7 @@
       </p:sp>
       <p:sp>
         <p:nvSpPr>
-          <p:cNvPr id="6" name="5 Marcador de número de diapositiva"/>
+          <p:cNvPr id="6" name="Slide Number Placeholder 5"/>
           <p:cNvSpPr>
             <a:spLocks noGrp="1"/>
           </p:cNvSpPr>
@@ -514,11 +553,6 @@
         </p:txBody>
       </p:sp>
     </p:spTree>
-    <p:extLst>
-      <p:ext uri="{BB962C8B-B14F-4D97-AF65-F5344CB8AC3E}">
-        <p14:creationId xmlns:p14="http://schemas.microsoft.com/office/powerpoint/2010/main" val="142765187"/>
-      </p:ext>
-    </p:extLst>
   </p:cSld>
   <p:clrMapOvr>
     <a:masterClrMapping/>
@@ -545,7 +579,7 @@
       </p:grpSpPr>
       <p:sp>
         <p:nvSpPr>
-          <p:cNvPr id="2" name="1 Título vertical"/>
+          <p:cNvPr id="2" name="Vertical Title 1"/>
           <p:cNvSpPr>
             <a:spLocks noGrp="1"/>
           </p:cNvSpPr>
@@ -555,25 +589,25 @@
         </p:nvSpPr>
         <p:spPr>
           <a:xfrm>
-            <a:off x="6629400" y="274638"/>
-            <a:ext cx="2057400" cy="5851525"/>
+            <a:off x="6629400" y="609600"/>
+            <a:ext cx="2057400" cy="5867400"/>
           </a:xfrm>
         </p:spPr>
         <p:txBody>
-          <a:bodyPr vert="eaVert"/>
+          <a:bodyPr vert="eaVert" anchor="b"/>
           <a:lstStyle/>
           <a:p>
             <a:r>
               <a:rPr lang="es-ES" smtClean="0"/>
               <a:t>Haga clic para modificar el estilo de título del patrón</a:t>
             </a:r>
-            <a:endParaRPr lang="es-MX"/>
-          </a:p>
-        </p:txBody>
-      </p:sp>
-      <p:sp>
-        <p:nvSpPr>
-          <p:cNvPr id="3" name="2 Marcador de texto vertical"/>
+            <a:endParaRPr lang="en-US" dirty="0"/>
+          </a:p>
+        </p:txBody>
+      </p:sp>
+      <p:sp>
+        <p:nvSpPr>
+          <p:cNvPr id="3" name="Vertical Text Placeholder 2"/>
           <p:cNvSpPr>
             <a:spLocks noGrp="1"/>
           </p:cNvSpPr>
@@ -583,8 +617,8 @@
         </p:nvSpPr>
         <p:spPr>
           <a:xfrm>
-            <a:off x="457200" y="274638"/>
-            <a:ext cx="6019800" cy="5851525"/>
+            <a:off x="457200" y="609600"/>
+            <a:ext cx="6019800" cy="5867400"/>
           </a:xfrm>
         </p:spPr>
         <p:txBody>
@@ -624,13 +658,13 @@
               <a:rPr lang="es-ES" smtClean="0"/>
               <a:t>Quinto nivel</a:t>
             </a:r>
-            <a:endParaRPr lang="es-MX"/>
-          </a:p>
-        </p:txBody>
-      </p:sp>
-      <p:sp>
-        <p:nvSpPr>
-          <p:cNvPr id="4" name="3 Marcador de fecha"/>
+            <a:endParaRPr lang="en-US" dirty="0"/>
+          </a:p>
+        </p:txBody>
+      </p:sp>
+      <p:sp>
+        <p:nvSpPr>
+          <p:cNvPr id="4" name="Date Placeholder 3"/>
           <p:cNvSpPr>
             <a:spLocks noGrp="1"/>
           </p:cNvSpPr>
@@ -653,7 +687,7 @@
       </p:sp>
       <p:sp>
         <p:nvSpPr>
-          <p:cNvPr id="5" name="4 Marcador de pie de página"/>
+          <p:cNvPr id="5" name="Footer Placeholder 4"/>
           <p:cNvSpPr>
             <a:spLocks noGrp="1"/>
           </p:cNvSpPr>
@@ -672,7 +706,7 @@
       </p:sp>
       <p:sp>
         <p:nvSpPr>
-          <p:cNvPr id="6" name="5 Marcador de número de diapositiva"/>
+          <p:cNvPr id="6" name="Slide Number Placeholder 5"/>
           <p:cNvSpPr>
             <a:spLocks noGrp="1"/>
           </p:cNvSpPr>
@@ -694,11 +728,6 @@
         </p:txBody>
       </p:sp>
     </p:spTree>
-    <p:extLst>
-      <p:ext uri="{BB962C8B-B14F-4D97-AF65-F5344CB8AC3E}">
-        <p14:creationId xmlns:p14="http://schemas.microsoft.com/office/powerpoint/2010/main" val="1560916804"/>
-      </p:ext>
-    </p:extLst>
   </p:cSld>
   <p:clrMapOvr>
     <a:masterClrMapping/>
@@ -725,7 +754,7 @@
       </p:grpSpPr>
       <p:sp>
         <p:nvSpPr>
-          <p:cNvPr id="2" name="1 Título"/>
+          <p:cNvPr id="2" name="Title 1"/>
           <p:cNvSpPr>
             <a:spLocks noGrp="1"/>
           </p:cNvSpPr>
@@ -742,13 +771,13 @@
               <a:rPr lang="es-ES" smtClean="0"/>
               <a:t>Haga clic para modificar el estilo de título del patrón</a:t>
             </a:r>
-            <a:endParaRPr lang="es-MX"/>
-          </a:p>
-        </p:txBody>
-      </p:sp>
-      <p:sp>
-        <p:nvSpPr>
-          <p:cNvPr id="3" name="2 Marcador de contenido"/>
+            <a:endParaRPr lang="en-US"/>
+          </a:p>
+        </p:txBody>
+      </p:sp>
+      <p:sp>
+        <p:nvSpPr>
+          <p:cNvPr id="3" name="Content Placeholder 2"/>
           <p:cNvSpPr>
             <a:spLocks noGrp="1"/>
           </p:cNvSpPr>
@@ -794,13 +823,13 @@
               <a:rPr lang="es-ES" smtClean="0"/>
               <a:t>Quinto nivel</a:t>
             </a:r>
-            <a:endParaRPr lang="es-MX"/>
-          </a:p>
-        </p:txBody>
-      </p:sp>
-      <p:sp>
-        <p:nvSpPr>
-          <p:cNvPr id="4" name="3 Marcador de fecha"/>
+            <a:endParaRPr lang="en-US"/>
+          </a:p>
+        </p:txBody>
+      </p:sp>
+      <p:sp>
+        <p:nvSpPr>
+          <p:cNvPr id="4" name="Date Placeholder 3"/>
           <p:cNvSpPr>
             <a:spLocks noGrp="1"/>
           </p:cNvSpPr>
@@ -823,7 +852,7 @@
       </p:sp>
       <p:sp>
         <p:nvSpPr>
-          <p:cNvPr id="5" name="4 Marcador de pie de página"/>
+          <p:cNvPr id="5" name="Footer Placeholder 4"/>
           <p:cNvSpPr>
             <a:spLocks noGrp="1"/>
           </p:cNvSpPr>
@@ -842,7 +871,7 @@
       </p:sp>
       <p:sp>
         <p:nvSpPr>
-          <p:cNvPr id="6" name="5 Marcador de número de diapositiva"/>
+          <p:cNvPr id="6" name="Slide Number Placeholder 5"/>
           <p:cNvSpPr>
             <a:spLocks noGrp="1"/>
           </p:cNvSpPr>
@@ -864,11 +893,6 @@
         </p:txBody>
       </p:sp>
     </p:spTree>
-    <p:extLst>
-      <p:ext uri="{BB962C8B-B14F-4D97-AF65-F5344CB8AC3E}">
-        <p14:creationId xmlns:p14="http://schemas.microsoft.com/office/powerpoint/2010/main" val="2966564697"/>
-      </p:ext>
-    </p:extLst>
   </p:cSld>
   <p:clrMapOvr>
     <a:masterClrMapping/>
@@ -879,6 +903,11 @@
 <file path=ppt/slideLayouts/slideLayout3.xml><?xml version="1.0" encoding="utf-8"?>
 <p:sldLayout xmlns:a="http://schemas.openxmlformats.org/drawingml/2006/main" xmlns:r="http://schemas.openxmlformats.org/officeDocument/2006/relationships" xmlns:p="http://schemas.openxmlformats.org/presentationml/2006/main" type="secHead" preserve="1">
   <p:cSld name="Encabezado de sección">
+    <p:bg>
+      <p:bgRef idx="1001">
+        <a:schemeClr val="bg2"/>
+      </p:bgRef>
+    </p:bg>
     <p:spTree>
       <p:nvGrpSpPr>
         <p:cNvPr id="1" name=""/>
@@ -895,7 +924,7 @@
       </p:grpSpPr>
       <p:sp>
         <p:nvSpPr>
-          <p:cNvPr id="2" name="1 Título"/>
+          <p:cNvPr id="2" name="Title 1"/>
           <p:cNvSpPr>
             <a:spLocks noGrp="1"/>
           </p:cNvSpPr>
@@ -905,15 +934,17 @@
         </p:nvSpPr>
         <p:spPr>
           <a:xfrm>
-            <a:off x="722313" y="4406900"/>
-            <a:ext cx="7772400" cy="1362075"/>
+            <a:off x="722313" y="2362200"/>
+            <a:ext cx="7772400" cy="2200275"/>
           </a:xfrm>
         </p:spPr>
         <p:txBody>
-          <a:bodyPr anchor="t"/>
+          <a:bodyPr anchor="b">
+            <a:normAutofit/>
+          </a:bodyPr>
           <a:lstStyle>
             <a:lvl1pPr algn="l">
-              <a:defRPr sz="4000" b="1" cap="all"/>
+              <a:defRPr sz="4800" b="0" cap="all"/>
             </a:lvl1pPr>
           </a:lstStyle>
           <a:p>
@@ -921,13 +952,13 @@
               <a:rPr lang="es-ES" smtClean="0"/>
               <a:t>Haga clic para modificar el estilo de título del patrón</a:t>
             </a:r>
-            <a:endParaRPr lang="es-MX"/>
-          </a:p>
-        </p:txBody>
-      </p:sp>
-      <p:sp>
-        <p:nvSpPr>
-          <p:cNvPr id="3" name="2 Marcador de texto"/>
+            <a:endParaRPr lang="en-US" dirty="0"/>
+          </a:p>
+        </p:txBody>
+      </p:sp>
+      <p:sp>
+        <p:nvSpPr>
+          <p:cNvPr id="3" name="Text Placeholder 2"/>
           <p:cNvSpPr>
             <a:spLocks noGrp="1"/>
           </p:cNvSpPr>
@@ -937,20 +968,20 @@
         </p:nvSpPr>
         <p:spPr>
           <a:xfrm>
-            <a:off x="722313" y="2906713"/>
+            <a:off x="722313" y="4626864"/>
             <a:ext cx="7772400" cy="1500187"/>
           </a:xfrm>
         </p:spPr>
         <p:txBody>
-          <a:bodyPr anchor="b"/>
+          <a:bodyPr anchor="t">
+            <a:normAutofit/>
+          </a:bodyPr>
           <a:lstStyle>
             <a:lvl1pPr marL="0" indent="0">
               <a:buNone/>
-              <a:defRPr sz="2000">
+              <a:defRPr sz="2400">
                 <a:solidFill>
-                  <a:schemeClr val="tx1">
-                    <a:tint val="75000"/>
-                  </a:schemeClr>
+                  <a:schemeClr val="tx2"/>
                 </a:solidFill>
               </a:defRPr>
             </a:lvl1pPr>
@@ -1046,7 +1077,7 @@
       </p:sp>
       <p:sp>
         <p:nvSpPr>
-          <p:cNvPr id="4" name="3 Marcador de fecha"/>
+          <p:cNvPr id="4" name="Date Placeholder 3"/>
           <p:cNvSpPr>
             <a:spLocks noGrp="1"/>
           </p:cNvSpPr>
@@ -1069,7 +1100,7 @@
       </p:sp>
       <p:sp>
         <p:nvSpPr>
-          <p:cNvPr id="5" name="4 Marcador de pie de página"/>
+          <p:cNvPr id="5" name="Footer Placeholder 4"/>
           <p:cNvSpPr>
             <a:spLocks noGrp="1"/>
           </p:cNvSpPr>
@@ -1088,7 +1119,7 @@
       </p:sp>
       <p:sp>
         <p:nvSpPr>
-          <p:cNvPr id="6" name="5 Marcador de número de diapositiva"/>
+          <p:cNvPr id="6" name="Slide Number Placeholder 5"/>
           <p:cNvSpPr>
             <a:spLocks noGrp="1"/>
           </p:cNvSpPr>
@@ -1109,15 +1140,45 @@
           </a:p>
         </p:txBody>
       </p:sp>
+      <p:cxnSp>
+        <p:nvCxnSpPr>
+          <p:cNvPr id="7" name="Straight Connector 6"/>
+          <p:cNvCxnSpPr/>
+          <p:nvPr/>
+        </p:nvCxnSpPr>
+        <p:spPr>
+          <a:xfrm>
+            <a:off x="731520" y="4599432"/>
+            <a:ext cx="7848600" cy="1588"/>
+          </a:xfrm>
+          <a:prstGeom prst="line">
+            <a:avLst/>
+          </a:prstGeom>
+          <a:ln w="19050">
+            <a:solidFill>
+              <a:schemeClr val="tx2"/>
+            </a:solidFill>
+          </a:ln>
+        </p:spPr>
+        <p:style>
+          <a:lnRef idx="1">
+            <a:schemeClr val="accent1"/>
+          </a:lnRef>
+          <a:fillRef idx="0">
+            <a:schemeClr val="accent1"/>
+          </a:fillRef>
+          <a:effectRef idx="0">
+            <a:schemeClr val="accent1"/>
+          </a:effectRef>
+          <a:fontRef idx="minor">
+            <a:schemeClr val="tx1"/>
+          </a:fontRef>
+        </p:style>
+      </p:cxnSp>
     </p:spTree>
-    <p:extLst>
-      <p:ext uri="{BB962C8B-B14F-4D97-AF65-F5344CB8AC3E}">
-        <p14:creationId xmlns:p14="http://schemas.microsoft.com/office/powerpoint/2010/main" val="2579287761"/>
-      </p:ext>
-    </p:extLst>
   </p:cSld>
   <p:clrMapOvr>
-    <a:masterClrMapping/>
+    <a:overrideClrMapping bg1="dk1" tx1="lt1" bg2="dk2" tx2="lt2" accent1="accent1" accent2="accent2" accent3="accent3" accent4="accent4" accent5="accent5" accent6="accent6" hlink="hlink" folHlink="folHlink"/>
   </p:clrMapOvr>
 </p:sldLayout>
 </file>
@@ -1141,7 +1202,7 @@
       </p:grpSpPr>
       <p:sp>
         <p:nvSpPr>
-          <p:cNvPr id="2" name="1 Título"/>
+          <p:cNvPr id="2" name="Title 1"/>
           <p:cNvSpPr>
             <a:spLocks noGrp="1"/>
           </p:cNvSpPr>
@@ -1158,13 +1219,13 @@
               <a:rPr lang="es-ES" smtClean="0"/>
               <a:t>Haga clic para modificar el estilo de título del patrón</a:t>
             </a:r>
-            <a:endParaRPr lang="es-MX"/>
-          </a:p>
-        </p:txBody>
-      </p:sp>
-      <p:sp>
-        <p:nvSpPr>
-          <p:cNvPr id="3" name="2 Marcador de contenido"/>
+            <a:endParaRPr lang="en-US"/>
+          </a:p>
+        </p:txBody>
+      </p:sp>
+      <p:sp>
+        <p:nvSpPr>
+          <p:cNvPr id="3" name="Content Placeholder 2"/>
           <p:cNvSpPr>
             <a:spLocks noGrp="1"/>
           </p:cNvSpPr>
@@ -1174,8 +1235,8 @@
         </p:nvSpPr>
         <p:spPr>
           <a:xfrm>
-            <a:off x="457200" y="1600200"/>
-            <a:ext cx="4038600" cy="4525963"/>
+            <a:off x="457200" y="1673352"/>
+            <a:ext cx="4038600" cy="4718304"/>
           </a:xfrm>
         </p:spPr>
         <p:txBody>
@@ -1243,13 +1304,13 @@
               <a:rPr lang="es-ES" smtClean="0"/>
               <a:t>Quinto nivel</a:t>
             </a:r>
-            <a:endParaRPr lang="es-MX"/>
-          </a:p>
-        </p:txBody>
-      </p:sp>
-      <p:sp>
-        <p:nvSpPr>
-          <p:cNvPr id="4" name="3 Marcador de contenido"/>
+            <a:endParaRPr lang="en-US" dirty="0"/>
+          </a:p>
+        </p:txBody>
+      </p:sp>
+      <p:sp>
+        <p:nvSpPr>
+          <p:cNvPr id="4" name="Content Placeholder 3"/>
           <p:cNvSpPr>
             <a:spLocks noGrp="1"/>
           </p:cNvSpPr>
@@ -1259,8 +1320,8 @@
         </p:nvSpPr>
         <p:spPr>
           <a:xfrm>
-            <a:off x="4648200" y="1600200"/>
-            <a:ext cx="4038600" cy="4525963"/>
+            <a:off x="4648200" y="1673352"/>
+            <a:ext cx="4038600" cy="4718304"/>
           </a:xfrm>
         </p:spPr>
         <p:txBody>
@@ -1328,13 +1389,13 @@
               <a:rPr lang="es-ES" smtClean="0"/>
               <a:t>Quinto nivel</a:t>
             </a:r>
-            <a:endParaRPr lang="es-MX"/>
-          </a:p>
-        </p:txBody>
-      </p:sp>
-      <p:sp>
-        <p:nvSpPr>
-          <p:cNvPr id="5" name="4 Marcador de fecha"/>
+            <a:endParaRPr lang="en-US" dirty="0"/>
+          </a:p>
+        </p:txBody>
+      </p:sp>
+      <p:sp>
+        <p:nvSpPr>
+          <p:cNvPr id="5" name="Date Placeholder 4"/>
           <p:cNvSpPr>
             <a:spLocks noGrp="1"/>
           </p:cNvSpPr>
@@ -1357,7 +1418,7 @@
       </p:sp>
       <p:sp>
         <p:nvSpPr>
-          <p:cNvPr id="6" name="5 Marcador de pie de página"/>
+          <p:cNvPr id="6" name="Footer Placeholder 5"/>
           <p:cNvSpPr>
             <a:spLocks noGrp="1"/>
           </p:cNvSpPr>
@@ -1376,7 +1437,7 @@
       </p:sp>
       <p:sp>
         <p:nvSpPr>
-          <p:cNvPr id="7" name="6 Marcador de número de diapositiva"/>
+          <p:cNvPr id="7" name="Slide Number Placeholder 6"/>
           <p:cNvSpPr>
             <a:spLocks noGrp="1"/>
           </p:cNvSpPr>
@@ -1398,11 +1459,6 @@
         </p:txBody>
       </p:sp>
     </p:spTree>
-    <p:extLst>
-      <p:ext uri="{BB962C8B-B14F-4D97-AF65-F5344CB8AC3E}">
-        <p14:creationId xmlns:p14="http://schemas.microsoft.com/office/powerpoint/2010/main" val="1777271550"/>
-      </p:ext>
-    </p:extLst>
   </p:cSld>
   <p:clrMapOvr>
     <a:masterClrMapping/>
@@ -1429,7 +1485,7 @@
       </p:grpSpPr>
       <p:sp>
         <p:nvSpPr>
-          <p:cNvPr id="2" name="1 Título"/>
+          <p:cNvPr id="2" name="Title 1"/>
           <p:cNvSpPr>
             <a:spLocks noGrp="1"/>
           </p:cNvSpPr>
@@ -1450,13 +1506,13 @@
               <a:rPr lang="es-ES" smtClean="0"/>
               <a:t>Haga clic para modificar el estilo de título del patrón</a:t>
             </a:r>
-            <a:endParaRPr lang="es-MX"/>
-          </a:p>
-        </p:txBody>
-      </p:sp>
-      <p:sp>
-        <p:nvSpPr>
-          <p:cNvPr id="3" name="2 Marcador de texto"/>
+            <a:endParaRPr lang="en-US" dirty="0"/>
+          </a:p>
+        </p:txBody>
+      </p:sp>
+      <p:sp>
+        <p:nvSpPr>
+          <p:cNvPr id="3" name="Text Placeholder 2"/>
           <p:cNvSpPr>
             <a:spLocks noGrp="1"/>
           </p:cNvSpPr>
@@ -1466,16 +1522,39 @@
         </p:nvSpPr>
         <p:spPr>
           <a:xfrm>
-            <a:off x="457200" y="1535113"/>
-            <a:ext cx="4040188" cy="639762"/>
+            <a:off x="457200" y="1676400"/>
+            <a:ext cx="3931920" cy="639762"/>
           </a:xfrm>
+          <a:noFill/>
+          <a:ln>
+            <a:noFill/>
+          </a:ln>
+          <a:effectLst/>
         </p:spPr>
-        <p:txBody>
-          <a:bodyPr anchor="b"/>
+        <p:style>
+          <a:lnRef idx="3">
+            <a:schemeClr val="lt1"/>
+          </a:lnRef>
+          <a:fillRef idx="1">
+            <a:schemeClr val="accent2"/>
+          </a:fillRef>
+          <a:effectRef idx="1">
+            <a:schemeClr val="accent2"/>
+          </a:effectRef>
+          <a:fontRef idx="none"/>
+        </p:style>
+        <p:txBody>
+          <a:bodyPr anchor="ctr">
+            <a:normAutofit/>
+          </a:bodyPr>
           <a:lstStyle>
-            <a:lvl1pPr marL="0" indent="0">
-              <a:buNone/>
-              <a:defRPr sz="2400" b="1"/>
+            <a:lvl1pPr marL="0" indent="0" algn="ctr">
+              <a:buNone/>
+              <a:defRPr sz="2000" b="0">
+                <a:solidFill>
+                  <a:schemeClr val="tx2"/>
+                </a:solidFill>
+              </a:defRPr>
             </a:lvl1pPr>
             <a:lvl2pPr marL="457200" indent="0">
               <a:buNone/>
@@ -1521,7 +1600,7 @@
       </p:sp>
       <p:sp>
         <p:nvSpPr>
-          <p:cNvPr id="4" name="3 Marcador de contenido"/>
+          <p:cNvPr id="4" name="Content Placeholder 3"/>
           <p:cNvSpPr>
             <a:spLocks noGrp="1"/>
           </p:cNvSpPr>
@@ -1531,8 +1610,8 @@
         </p:nvSpPr>
         <p:spPr>
           <a:xfrm>
-            <a:off x="457200" y="2174875"/>
-            <a:ext cx="4040188" cy="3951288"/>
+            <a:off x="457200" y="2438400"/>
+            <a:ext cx="3931920" cy="3951288"/>
           </a:xfrm>
         </p:spPr>
         <p:txBody>
@@ -1600,13 +1679,13 @@
               <a:rPr lang="es-ES" smtClean="0"/>
               <a:t>Quinto nivel</a:t>
             </a:r>
-            <a:endParaRPr lang="es-MX"/>
-          </a:p>
-        </p:txBody>
-      </p:sp>
-      <p:sp>
-        <p:nvSpPr>
-          <p:cNvPr id="5" name="4 Marcador de texto"/>
+            <a:endParaRPr lang="en-US" dirty="0"/>
+          </a:p>
+        </p:txBody>
+      </p:sp>
+      <p:sp>
+        <p:nvSpPr>
+          <p:cNvPr id="5" name="Text Placeholder 4"/>
           <p:cNvSpPr>
             <a:spLocks noGrp="1"/>
           </p:cNvSpPr>
@@ -1616,16 +1695,42 @@
         </p:nvSpPr>
         <p:spPr>
           <a:xfrm>
-            <a:off x="4645025" y="1535113"/>
-            <a:ext cx="4041775" cy="639762"/>
+            <a:off x="4754880" y="1676400"/>
+            <a:ext cx="3931920" cy="639762"/>
           </a:xfrm>
+          <a:noFill/>
+          <a:ln>
+            <a:noFill/>
+          </a:ln>
+          <a:effectLst/>
         </p:spPr>
-        <p:txBody>
-          <a:bodyPr anchor="b"/>
+        <p:style>
+          <a:lnRef idx="3">
+            <a:schemeClr val="lt1"/>
+          </a:lnRef>
+          <a:fillRef idx="1">
+            <a:schemeClr val="accent2"/>
+          </a:fillRef>
+          <a:effectRef idx="1">
+            <a:schemeClr val="accent2"/>
+          </a:effectRef>
+          <a:fontRef idx="none"/>
+        </p:style>
+        <p:txBody>
+          <a:bodyPr anchor="ctr">
+            <a:normAutofit/>
+          </a:bodyPr>
           <a:lstStyle>
-            <a:lvl1pPr marL="0" indent="0">
-              <a:buNone/>
-              <a:defRPr sz="2400" b="1"/>
+            <a:lvl1pPr marL="0" indent="0" algn="ctr">
+              <a:buNone/>
+              <a:defRPr lang="en-US" sz="2000" b="0" kern="1200" dirty="0" smtClean="0">
+                <a:solidFill>
+                  <a:schemeClr val="tx2"/>
+                </a:solidFill>
+                <a:latin typeface="+mn-lt"/>
+                <a:ea typeface="+mn-ea"/>
+                <a:cs typeface="+mn-cs"/>
+              </a:defRPr>
             </a:lvl1pPr>
             <a:lvl2pPr marL="457200" indent="0">
               <a:buNone/>
@@ -1671,7 +1776,7 @@
       </p:sp>
       <p:sp>
         <p:nvSpPr>
-          <p:cNvPr id="6" name="5 Marcador de contenido"/>
+          <p:cNvPr id="6" name="Content Placeholder 5"/>
           <p:cNvSpPr>
             <a:spLocks noGrp="1"/>
           </p:cNvSpPr>
@@ -1681,8 +1786,8 @@
         </p:nvSpPr>
         <p:spPr>
           <a:xfrm>
-            <a:off x="4645025" y="2174875"/>
-            <a:ext cx="4041775" cy="3951288"/>
+            <a:off x="4754880" y="2438400"/>
+            <a:ext cx="3931920" cy="3951288"/>
           </a:xfrm>
         </p:spPr>
         <p:txBody>
@@ -1750,13 +1855,13 @@
               <a:rPr lang="es-ES" smtClean="0"/>
               <a:t>Quinto nivel</a:t>
             </a:r>
-            <a:endParaRPr lang="es-MX"/>
-          </a:p>
-        </p:txBody>
-      </p:sp>
-      <p:sp>
-        <p:nvSpPr>
-          <p:cNvPr id="7" name="6 Marcador de fecha"/>
+            <a:endParaRPr lang="en-US" dirty="0"/>
+          </a:p>
+        </p:txBody>
+      </p:sp>
+      <p:sp>
+        <p:nvSpPr>
+          <p:cNvPr id="7" name="Date Placeholder 6"/>
           <p:cNvSpPr>
             <a:spLocks noGrp="1"/>
           </p:cNvSpPr>
@@ -1779,7 +1884,7 @@
       </p:sp>
       <p:sp>
         <p:nvSpPr>
-          <p:cNvPr id="8" name="7 Marcador de pie de página"/>
+          <p:cNvPr id="8" name="Footer Placeholder 7"/>
           <p:cNvSpPr>
             <a:spLocks noGrp="1"/>
           </p:cNvSpPr>
@@ -1798,7 +1903,7 @@
       </p:sp>
       <p:sp>
         <p:nvSpPr>
-          <p:cNvPr id="9" name="8 Marcador de número de diapositiva"/>
+          <p:cNvPr id="9" name="Slide Number Placeholder 8"/>
           <p:cNvSpPr>
             <a:spLocks noGrp="1"/>
           </p:cNvSpPr>
@@ -1819,12 +1924,42 @@
           </a:p>
         </p:txBody>
       </p:sp>
+      <p:cxnSp>
+        <p:nvCxnSpPr>
+          <p:cNvPr id="11" name="Straight Connector 10"/>
+          <p:cNvCxnSpPr/>
+          <p:nvPr/>
+        </p:nvCxnSpPr>
+        <p:spPr>
+          <a:xfrm rot="5400000">
+            <a:off x="2217817" y="4045823"/>
+            <a:ext cx="4709160" cy="794"/>
+          </a:xfrm>
+          <a:prstGeom prst="line">
+            <a:avLst/>
+          </a:prstGeom>
+          <a:ln w="19050">
+            <a:solidFill>
+              <a:schemeClr val="tx2"/>
+            </a:solidFill>
+          </a:ln>
+        </p:spPr>
+        <p:style>
+          <a:lnRef idx="1">
+            <a:schemeClr val="accent1"/>
+          </a:lnRef>
+          <a:fillRef idx="0">
+            <a:schemeClr val="accent1"/>
+          </a:fillRef>
+          <a:effectRef idx="0">
+            <a:schemeClr val="accent1"/>
+          </a:effectRef>
+          <a:fontRef idx="minor">
+            <a:schemeClr val="tx1"/>
+          </a:fontRef>
+        </p:style>
+      </p:cxnSp>
     </p:spTree>
-    <p:extLst>
-      <p:ext uri="{BB962C8B-B14F-4D97-AF65-F5344CB8AC3E}">
-        <p14:creationId xmlns:p14="http://schemas.microsoft.com/office/powerpoint/2010/main" val="1351897009"/>
-      </p:ext>
-    </p:extLst>
   </p:cSld>
   <p:clrMapOvr>
     <a:masterClrMapping/>
@@ -1851,7 +1986,7 @@
       </p:grpSpPr>
       <p:sp>
         <p:nvSpPr>
-          <p:cNvPr id="2" name="1 Título"/>
+          <p:cNvPr id="2" name="Title 1"/>
           <p:cNvSpPr>
             <a:spLocks noGrp="1"/>
           </p:cNvSpPr>
@@ -1868,13 +2003,13 @@
               <a:rPr lang="es-ES" smtClean="0"/>
               <a:t>Haga clic para modificar el estilo de título del patrón</a:t>
             </a:r>
-            <a:endParaRPr lang="es-MX"/>
-          </a:p>
-        </p:txBody>
-      </p:sp>
-      <p:sp>
-        <p:nvSpPr>
-          <p:cNvPr id="3" name="2 Marcador de fecha"/>
+            <a:endParaRPr lang="en-US"/>
+          </a:p>
+        </p:txBody>
+      </p:sp>
+      <p:sp>
+        <p:nvSpPr>
+          <p:cNvPr id="3" name="Date Placeholder 2"/>
           <p:cNvSpPr>
             <a:spLocks noGrp="1"/>
           </p:cNvSpPr>
@@ -1897,7 +2032,7 @@
       </p:sp>
       <p:sp>
         <p:nvSpPr>
-          <p:cNvPr id="4" name="3 Marcador de pie de página"/>
+          <p:cNvPr id="4" name="Footer Placeholder 3"/>
           <p:cNvSpPr>
             <a:spLocks noGrp="1"/>
           </p:cNvSpPr>
@@ -1916,7 +2051,7 @@
       </p:sp>
       <p:sp>
         <p:nvSpPr>
-          <p:cNvPr id="5" name="4 Marcador de número de diapositiva"/>
+          <p:cNvPr id="5" name="Slide Number Placeholder 4"/>
           <p:cNvSpPr>
             <a:spLocks noGrp="1"/>
           </p:cNvSpPr>
@@ -1938,11 +2073,6 @@
         </p:txBody>
       </p:sp>
     </p:spTree>
-    <p:extLst>
-      <p:ext uri="{BB962C8B-B14F-4D97-AF65-F5344CB8AC3E}">
-        <p14:creationId xmlns:p14="http://schemas.microsoft.com/office/powerpoint/2010/main" val="3672654409"/>
-      </p:ext>
-    </p:extLst>
   </p:cSld>
   <p:clrMapOvr>
     <a:masterClrMapping/>
@@ -1969,7 +2099,7 @@
       </p:grpSpPr>
       <p:sp>
         <p:nvSpPr>
-          <p:cNvPr id="2" name="1 Marcador de fecha"/>
+          <p:cNvPr id="2" name="Date Placeholder 1"/>
           <p:cNvSpPr>
             <a:spLocks noGrp="1"/>
           </p:cNvSpPr>
@@ -1992,7 +2122,7 @@
       </p:sp>
       <p:sp>
         <p:nvSpPr>
-          <p:cNvPr id="3" name="2 Marcador de pie de página"/>
+          <p:cNvPr id="3" name="Footer Placeholder 2"/>
           <p:cNvSpPr>
             <a:spLocks noGrp="1"/>
           </p:cNvSpPr>
@@ -2011,7 +2141,7 @@
       </p:sp>
       <p:sp>
         <p:nvSpPr>
-          <p:cNvPr id="4" name="3 Marcador de número de diapositiva"/>
+          <p:cNvPr id="4" name="Slide Number Placeholder 3"/>
           <p:cNvSpPr>
             <a:spLocks noGrp="1"/>
           </p:cNvSpPr>
@@ -2033,11 +2163,6 @@
         </p:txBody>
       </p:sp>
     </p:spTree>
-    <p:extLst>
-      <p:ext uri="{BB962C8B-B14F-4D97-AF65-F5344CB8AC3E}">
-        <p14:creationId xmlns:p14="http://schemas.microsoft.com/office/powerpoint/2010/main" val="1565294779"/>
-      </p:ext>
-    </p:extLst>
   </p:cSld>
   <p:clrMapOvr>
     <a:masterClrMapping/>
@@ -2064,7 +2189,7 @@
       </p:grpSpPr>
       <p:sp>
         <p:nvSpPr>
-          <p:cNvPr id="2" name="1 Título"/>
+          <p:cNvPr id="2" name="Title 1"/>
           <p:cNvSpPr>
             <a:spLocks noGrp="1"/>
           </p:cNvSpPr>
@@ -2074,15 +2199,17 @@
         </p:nvSpPr>
         <p:spPr>
           <a:xfrm>
-            <a:off x="457200" y="273050"/>
-            <a:ext cx="3008313" cy="1162050"/>
+            <a:off x="457200" y="792080"/>
+            <a:ext cx="2139696" cy="1261872"/>
           </a:xfrm>
         </p:spPr>
         <p:txBody>
-          <a:bodyPr anchor="b"/>
+          <a:bodyPr anchor="b">
+            <a:noAutofit/>
+          </a:bodyPr>
           <a:lstStyle>
             <a:lvl1pPr algn="l">
-              <a:defRPr sz="2000" b="1"/>
+              <a:defRPr sz="2400" b="0"/>
             </a:lvl1pPr>
           </a:lstStyle>
           <a:p>
@@ -2090,13 +2217,13 @@
               <a:rPr lang="es-ES" smtClean="0"/>
               <a:t>Haga clic para modificar el estilo de título del patrón</a:t>
             </a:r>
-            <a:endParaRPr lang="es-MX"/>
-          </a:p>
-        </p:txBody>
-      </p:sp>
-      <p:sp>
-        <p:nvSpPr>
-          <p:cNvPr id="3" name="2 Marcador de contenido"/>
+            <a:endParaRPr lang="en-US" dirty="0"/>
+          </a:p>
+        </p:txBody>
+      </p:sp>
+      <p:sp>
+        <p:nvSpPr>
+          <p:cNvPr id="3" name="Content Placeholder 2"/>
           <p:cNvSpPr>
             <a:spLocks noGrp="1"/>
           </p:cNvSpPr>
@@ -2106,8 +2233,8 @@
         </p:nvSpPr>
         <p:spPr>
           <a:xfrm>
-            <a:off x="3575050" y="273050"/>
-            <a:ext cx="5111750" cy="5853113"/>
+            <a:off x="2971800" y="792080"/>
+            <a:ext cx="5715000" cy="5577840"/>
           </a:xfrm>
         </p:spPr>
         <p:txBody>
@@ -2175,13 +2302,13 @@
               <a:rPr lang="es-ES" smtClean="0"/>
               <a:t>Quinto nivel</a:t>
             </a:r>
-            <a:endParaRPr lang="es-MX"/>
-          </a:p>
-        </p:txBody>
-      </p:sp>
-      <p:sp>
-        <p:nvSpPr>
-          <p:cNvPr id="4" name="3 Marcador de texto"/>
+            <a:endParaRPr lang="en-US" dirty="0"/>
+          </a:p>
+        </p:txBody>
+      </p:sp>
+      <p:sp>
+        <p:nvSpPr>
+          <p:cNvPr id="4" name="Text Placeholder 3"/>
           <p:cNvSpPr>
             <a:spLocks noGrp="1"/>
           </p:cNvSpPr>
@@ -2191,8 +2318,8 @@
         </p:nvSpPr>
         <p:spPr>
           <a:xfrm>
-            <a:off x="457200" y="1435100"/>
-            <a:ext cx="3008313" cy="4691063"/>
+            <a:off x="457201" y="2130552"/>
+            <a:ext cx="2139696" cy="4243615"/>
           </a:xfrm>
         </p:spPr>
         <p:txBody>
@@ -2246,7 +2373,7 @@
       </p:sp>
       <p:sp>
         <p:nvSpPr>
-          <p:cNvPr id="5" name="4 Marcador de fecha"/>
+          <p:cNvPr id="5" name="Date Placeholder 4"/>
           <p:cNvSpPr>
             <a:spLocks noGrp="1"/>
           </p:cNvSpPr>
@@ -2269,7 +2396,7 @@
       </p:sp>
       <p:sp>
         <p:nvSpPr>
-          <p:cNvPr id="6" name="5 Marcador de pie de página"/>
+          <p:cNvPr id="6" name="Footer Placeholder 5"/>
           <p:cNvSpPr>
             <a:spLocks noGrp="1"/>
           </p:cNvSpPr>
@@ -2288,7 +2415,7 @@
       </p:sp>
       <p:sp>
         <p:nvSpPr>
-          <p:cNvPr id="7" name="6 Marcador de número de diapositiva"/>
+          <p:cNvPr id="7" name="Slide Number Placeholder 6"/>
           <p:cNvSpPr>
             <a:spLocks noGrp="1"/>
           </p:cNvSpPr>
@@ -2309,12 +2436,42 @@
           </a:p>
         </p:txBody>
       </p:sp>
+      <p:cxnSp>
+        <p:nvCxnSpPr>
+          <p:cNvPr id="9" name="Straight Connector 8"/>
+          <p:cNvCxnSpPr/>
+          <p:nvPr/>
+        </p:nvCxnSpPr>
+        <p:spPr>
+          <a:xfrm rot="5400000">
+            <a:off x="-13116" y="3580206"/>
+            <a:ext cx="5577840" cy="1588"/>
+          </a:xfrm>
+          <a:prstGeom prst="line">
+            <a:avLst/>
+          </a:prstGeom>
+          <a:ln w="19050">
+            <a:solidFill>
+              <a:schemeClr val="tx2"/>
+            </a:solidFill>
+          </a:ln>
+        </p:spPr>
+        <p:style>
+          <a:lnRef idx="1">
+            <a:schemeClr val="accent1"/>
+          </a:lnRef>
+          <a:fillRef idx="0">
+            <a:schemeClr val="accent1"/>
+          </a:fillRef>
+          <a:effectRef idx="0">
+            <a:schemeClr val="accent1"/>
+          </a:effectRef>
+          <a:fontRef idx="minor">
+            <a:schemeClr val="tx1"/>
+          </a:fontRef>
+        </p:style>
+      </p:cxnSp>
     </p:spTree>
-    <p:extLst>
-      <p:ext uri="{BB962C8B-B14F-4D97-AF65-F5344CB8AC3E}">
-        <p14:creationId xmlns:p14="http://schemas.microsoft.com/office/powerpoint/2010/main" val="2432840418"/>
-      </p:ext>
-    </p:extLst>
   </p:cSld>
   <p:clrMapOvr>
     <a:masterClrMapping/>
@@ -2341,7 +2498,7 @@
       </p:grpSpPr>
       <p:sp>
         <p:nvSpPr>
-          <p:cNvPr id="2" name="1 Título"/>
+          <p:cNvPr id="2" name="Title 1"/>
           <p:cNvSpPr>
             <a:spLocks noGrp="1"/>
           </p:cNvSpPr>
@@ -2351,15 +2508,17 @@
         </p:nvSpPr>
         <p:spPr>
           <a:xfrm>
-            <a:off x="1792288" y="4800600"/>
-            <a:ext cx="5486400" cy="566738"/>
+            <a:off x="457200" y="792480"/>
+            <a:ext cx="2142680" cy="1264920"/>
           </a:xfrm>
         </p:spPr>
         <p:txBody>
-          <a:bodyPr anchor="b"/>
+          <a:bodyPr anchor="b">
+            <a:normAutofit/>
+          </a:bodyPr>
           <a:lstStyle>
             <a:lvl1pPr algn="l">
-              <a:defRPr sz="2000" b="1"/>
+              <a:defRPr sz="2400" b="0"/>
             </a:lvl1pPr>
           </a:lstStyle>
           <a:p>
@@ -2367,13 +2526,13 @@
               <a:rPr lang="es-ES" smtClean="0"/>
               <a:t>Haga clic para modificar el estilo de título del patrón</a:t>
             </a:r>
-            <a:endParaRPr lang="es-MX"/>
-          </a:p>
-        </p:txBody>
-      </p:sp>
-      <p:sp>
-        <p:nvSpPr>
-          <p:cNvPr id="3" name="2 Marcador de posición de imagen"/>
+            <a:endParaRPr lang="en-US" dirty="0"/>
+          </a:p>
+        </p:txBody>
+      </p:sp>
+      <p:sp>
+        <p:nvSpPr>
+          <p:cNvPr id="3" name="Picture Placeholder 2"/>
           <p:cNvSpPr>
             <a:spLocks noGrp="1"/>
           </p:cNvSpPr>
@@ -2383,9 +2542,25 @@
         </p:nvSpPr>
         <p:spPr>
           <a:xfrm>
-            <a:off x="1792288" y="612775"/>
-            <a:ext cx="5486400" cy="4114800"/>
+            <a:off x="2858610" y="838201"/>
+            <a:ext cx="5904390" cy="5500456"/>
           </a:xfrm>
+          <a:solidFill>
+            <a:schemeClr val="bg2"/>
+          </a:solidFill>
+          <a:ln w="76200">
+            <a:solidFill>
+              <a:srgbClr val="FFFFFF"/>
+            </a:solidFill>
+            <a:miter lim="800000"/>
+          </a:ln>
+          <a:effectLst>
+            <a:outerShdw blurRad="50800" dist="12700" dir="5400000" algn="t" rotWithShape="0">
+              <a:prstClr val="black">
+                <a:alpha val="59000"/>
+              </a:prstClr>
+            </a:outerShdw>
+          </a:effectLst>
         </p:spPr>
         <p:txBody>
           <a:bodyPr/>
@@ -2428,13 +2603,17 @@
             </a:lvl9pPr>
           </a:lstStyle>
           <a:p>
-            <a:endParaRPr lang="es-MX"/>
-          </a:p>
-        </p:txBody>
-      </p:sp>
-      <p:sp>
-        <p:nvSpPr>
-          <p:cNvPr id="4" name="3 Marcador de texto"/>
+            <a:r>
+              <a:rPr lang="es-ES" smtClean="0"/>
+              <a:t>Haga clic en el icono para agregar una imagen</a:t>
+            </a:r>
+            <a:endParaRPr lang="en-US" dirty="0"/>
+          </a:p>
+        </p:txBody>
+      </p:sp>
+      <p:sp>
+        <p:nvSpPr>
+          <p:cNvPr id="4" name="Text Placeholder 3"/>
           <p:cNvSpPr>
             <a:spLocks noGrp="1"/>
           </p:cNvSpPr>
@@ -2444,8 +2623,8 @@
         </p:nvSpPr>
         <p:spPr>
           <a:xfrm>
-            <a:off x="1792288" y="5367338"/>
-            <a:ext cx="5486400" cy="804862"/>
+            <a:off x="457200" y="2133600"/>
+            <a:ext cx="2139696" cy="4242816"/>
           </a:xfrm>
         </p:spPr>
         <p:txBody>
@@ -2499,7 +2678,7 @@
       </p:sp>
       <p:sp>
         <p:nvSpPr>
-          <p:cNvPr id="5" name="4 Marcador de fecha"/>
+          <p:cNvPr id="5" name="Date Placeholder 4"/>
           <p:cNvSpPr>
             <a:spLocks noGrp="1"/>
           </p:cNvSpPr>
@@ -2522,7 +2701,7 @@
       </p:sp>
       <p:sp>
         <p:nvSpPr>
-          <p:cNvPr id="6" name="5 Marcador de pie de página"/>
+          <p:cNvPr id="6" name="Footer Placeholder 5"/>
           <p:cNvSpPr>
             <a:spLocks noGrp="1"/>
           </p:cNvSpPr>
@@ -2541,7 +2720,7 @@
       </p:sp>
       <p:sp>
         <p:nvSpPr>
-          <p:cNvPr id="7" name="6 Marcador de número de diapositiva"/>
+          <p:cNvPr id="7" name="Slide Number Placeholder 6"/>
           <p:cNvSpPr>
             <a:spLocks noGrp="1"/>
           </p:cNvSpPr>
@@ -2563,11 +2742,6 @@
         </p:txBody>
       </p:sp>
     </p:spTree>
-    <p:extLst>
-      <p:ext uri="{BB962C8B-B14F-4D97-AF65-F5344CB8AC3E}">
-        <p14:creationId xmlns:p14="http://schemas.microsoft.com/office/powerpoint/2010/main" val="767232559"/>
-      </p:ext>
-    </p:extLst>
   </p:cSld>
   <p:clrMapOvr>
     <a:masterClrMapping/>
@@ -2599,18 +2773,64 @@
       </p:grpSpPr>
       <p:sp>
         <p:nvSpPr>
-          <p:cNvPr id="2" name="1 Marcador de título"/>
-          <p:cNvSpPr>
-            <a:spLocks noGrp="1"/>
-          </p:cNvSpPr>
-          <p:nvPr>
-            <p:ph type="title"/>
-          </p:nvPr>
+          <p:cNvPr id="10" name="Rectangle 9"/>
+          <p:cNvSpPr/>
+          <p:nvPr/>
         </p:nvSpPr>
         <p:spPr>
           <a:xfrm>
-            <a:off x="457200" y="274638"/>
-            <a:ext cx="8229600" cy="1143000"/>
+            <a:off x="0" y="220786"/>
+            <a:ext cx="9144000" cy="228600"/>
+          </a:xfrm>
+          <a:prstGeom prst="rect">
+            <a:avLst/>
+          </a:prstGeom>
+          <a:solidFill>
+            <a:srgbClr val="FFFFFF"/>
+          </a:solidFill>
+          <a:ln>
+            <a:noFill/>
+          </a:ln>
+        </p:spPr>
+        <p:style>
+          <a:lnRef idx="2">
+            <a:schemeClr val="accent1">
+              <a:shade val="50000"/>
+            </a:schemeClr>
+          </a:lnRef>
+          <a:fillRef idx="1">
+            <a:schemeClr val="accent1"/>
+          </a:fillRef>
+          <a:effectRef idx="0">
+            <a:schemeClr val="accent1"/>
+          </a:effectRef>
+          <a:fontRef idx="minor">
+            <a:schemeClr val="lt1"/>
+          </a:fontRef>
+        </p:style>
+        <p:txBody>
+          <a:bodyPr rtlCol="0" anchor="ctr"/>
+          <a:lstStyle/>
+          <a:p>
+            <a:pPr algn="ctr"/>
+            <a:endParaRPr lang="en-US"/>
+          </a:p>
+        </p:txBody>
+      </p:sp>
+      <p:sp>
+        <p:nvSpPr>
+          <p:cNvPr id="2" name="Title Placeholder 1"/>
+          <p:cNvSpPr>
+            <a:spLocks noGrp="1"/>
+          </p:cNvSpPr>
+          <p:nvPr>
+            <p:ph type="title"/>
+          </p:nvPr>
+        </p:nvSpPr>
+        <p:spPr>
+          <a:xfrm>
+            <a:off x="457200" y="533400"/>
+            <a:ext cx="8229600" cy="990600"/>
           </a:xfrm>
           <a:prstGeom prst="rect">
             <a:avLst/>
@@ -2626,13 +2846,13 @@
               <a:rPr lang="es-ES" smtClean="0"/>
               <a:t>Haga clic para modificar el estilo de título del patrón</a:t>
             </a:r>
-            <a:endParaRPr lang="es-MX"/>
-          </a:p>
-        </p:txBody>
-      </p:sp>
-      <p:sp>
-        <p:nvSpPr>
-          <p:cNvPr id="3" name="2 Marcador de texto"/>
+            <a:endParaRPr lang="en-US" dirty="0"/>
+          </a:p>
+        </p:txBody>
+      </p:sp>
+      <p:sp>
+        <p:nvSpPr>
+          <p:cNvPr id="3" name="Text Placeholder 2"/>
           <p:cNvSpPr>
             <a:spLocks noGrp="1"/>
           </p:cNvSpPr>
@@ -2643,7 +2863,7 @@
         <p:spPr>
           <a:xfrm>
             <a:off x="457200" y="1600200"/>
-            <a:ext cx="8229600" cy="4525963"/>
+            <a:ext cx="8229600" cy="4876800"/>
           </a:xfrm>
           <a:prstGeom prst="rect">
             <a:avLst/>
@@ -2688,24 +2908,70 @@
               <a:rPr lang="es-ES" smtClean="0"/>
               <a:t>Quinto nivel</a:t>
             </a:r>
-            <a:endParaRPr lang="es-MX"/>
-          </a:p>
-        </p:txBody>
-      </p:sp>
-      <p:sp>
-        <p:nvSpPr>
-          <p:cNvPr id="4" name="3 Marcador de fecha"/>
-          <p:cNvSpPr>
-            <a:spLocks noGrp="1"/>
-          </p:cNvSpPr>
-          <p:nvPr>
-            <p:ph type="dt" sz="half" idx="2"/>
-          </p:nvPr>
+            <a:endParaRPr lang="en-US" dirty="0"/>
+          </a:p>
+        </p:txBody>
+      </p:sp>
+      <p:sp>
+        <p:nvSpPr>
+          <p:cNvPr id="7" name="Rectangle 6"/>
+          <p:cNvSpPr/>
+          <p:nvPr/>
         </p:nvSpPr>
         <p:spPr>
           <a:xfrm>
-            <a:off x="457200" y="6356350"/>
-            <a:ext cx="2133600" cy="365125"/>
+            <a:off x="0" y="0"/>
+            <a:ext cx="9144000" cy="365760"/>
+          </a:xfrm>
+          <a:prstGeom prst="rect">
+            <a:avLst/>
+          </a:prstGeom>
+          <a:solidFill>
+            <a:schemeClr val="accent1"/>
+          </a:solidFill>
+          <a:ln>
+            <a:noFill/>
+          </a:ln>
+        </p:spPr>
+        <p:style>
+          <a:lnRef idx="2">
+            <a:schemeClr val="accent1">
+              <a:shade val="50000"/>
+            </a:schemeClr>
+          </a:lnRef>
+          <a:fillRef idx="1">
+            <a:schemeClr val="accent1"/>
+          </a:fillRef>
+          <a:effectRef idx="0">
+            <a:schemeClr val="accent1"/>
+          </a:effectRef>
+          <a:fontRef idx="minor">
+            <a:schemeClr val="lt1"/>
+          </a:fontRef>
+        </p:style>
+        <p:txBody>
+          <a:bodyPr rtlCol="0" anchor="ctr"/>
+          <a:lstStyle/>
+          <a:p>
+            <a:pPr algn="ctr"/>
+            <a:endParaRPr lang="en-US"/>
+          </a:p>
+        </p:txBody>
+      </p:sp>
+      <p:sp>
+        <p:nvSpPr>
+          <p:cNvPr id="4" name="Date Placeholder 3"/>
+          <p:cNvSpPr>
+            <a:spLocks noGrp="1"/>
+          </p:cNvSpPr>
+          <p:nvPr>
+            <p:ph type="dt" sz="half" idx="2"/>
+          </p:nvPr>
+        </p:nvSpPr>
+        <p:spPr>
+          <a:xfrm>
+            <a:off x="457200" y="18288"/>
+            <a:ext cx="2895600" cy="329184"/>
           </a:xfrm>
           <a:prstGeom prst="rect">
             <a:avLst/>
@@ -2717,9 +2983,7 @@
             <a:lvl1pPr algn="l">
               <a:defRPr sz="1200">
                 <a:solidFill>
-                  <a:schemeClr val="tx1">
-                    <a:tint val="75000"/>
-                  </a:schemeClr>
+                  <a:srgbClr val="FFFFFF"/>
                 </a:solidFill>
               </a:defRPr>
             </a:lvl1pPr>
@@ -2735,7 +2999,7 @@
       </p:sp>
       <p:sp>
         <p:nvSpPr>
-          <p:cNvPr id="5" name="4 Marcador de pie de página"/>
+          <p:cNvPr id="5" name="Footer Placeholder 4"/>
           <p:cNvSpPr>
             <a:spLocks noGrp="1"/>
           </p:cNvSpPr>
@@ -2745,8 +3009,8 @@
         </p:nvSpPr>
         <p:spPr>
           <a:xfrm>
-            <a:off x="3124200" y="6356350"/>
-            <a:ext cx="2895600" cy="365125"/>
+            <a:off x="3429000" y="18288"/>
+            <a:ext cx="4114800" cy="329184"/>
           </a:xfrm>
           <a:prstGeom prst="rect">
             <a:avLst/>
@@ -2758,9 +3022,7 @@
             <a:lvl1pPr algn="ctr">
               <a:defRPr sz="1200">
                 <a:solidFill>
-                  <a:schemeClr val="tx1">
-                    <a:tint val="75000"/>
-                  </a:schemeClr>
+                  <a:srgbClr val="FFFFFF"/>
                 </a:solidFill>
               </a:defRPr>
             </a:lvl1pPr>
@@ -2772,7 +3034,7 @@
       </p:sp>
       <p:sp>
         <p:nvSpPr>
-          <p:cNvPr id="6" name="5 Marcador de número de diapositiva"/>
+          <p:cNvPr id="6" name="Slide Number Placeholder 5"/>
           <p:cNvSpPr>
             <a:spLocks noGrp="1"/>
           </p:cNvSpPr>
@@ -2782,8 +3044,8 @@
         </p:nvSpPr>
         <p:spPr>
           <a:xfrm>
-            <a:off x="6553200" y="6356350"/>
-            <a:ext cx="2133600" cy="365125"/>
+            <a:off x="7620000" y="18288"/>
+            <a:ext cx="1066800" cy="329184"/>
           </a:xfrm>
           <a:prstGeom prst="rect">
             <a:avLst/>
@@ -2792,12 +3054,10 @@
         <p:txBody>
           <a:bodyPr vert="horz" lIns="91440" tIns="45720" rIns="91440" bIns="45720" rtlCol="0" anchor="ctr"/>
           <a:lstStyle>
-            <a:lvl1pPr algn="r">
-              <a:defRPr sz="1200">
+            <a:lvl1pPr algn="l">
+              <a:defRPr sz="1400" b="1">
                 <a:solidFill>
-                  <a:schemeClr val="tx1">
-                    <a:tint val="75000"/>
-                  </a:schemeClr>
+                  <a:srgbClr val="FFFFFF"/>
                 </a:solidFill>
               </a:defRPr>
             </a:lvl1pPr>
@@ -2812,36 +3072,31 @@
         </p:txBody>
       </p:sp>
     </p:spTree>
-    <p:extLst>
-      <p:ext uri="{BB962C8B-B14F-4D97-AF65-F5344CB8AC3E}">
-        <p14:creationId xmlns:p14="http://schemas.microsoft.com/office/powerpoint/2010/main" val="701572329"/>
-      </p:ext>
-    </p:extLst>
   </p:cSld>
   <p:clrMap bg1="lt1" tx1="dk1" bg2="lt2" tx2="dk2" accent1="accent1" accent2="accent2" accent3="accent3" accent4="accent4" accent5="accent5" accent6="accent6" hlink="hlink" folHlink="folHlink"/>
   <p:sldLayoutIdLst>
-    <p:sldLayoutId id="2147483649" r:id="rId1"/>
-    <p:sldLayoutId id="2147483650" r:id="rId2"/>
-    <p:sldLayoutId id="2147483651" r:id="rId3"/>
-    <p:sldLayoutId id="2147483652" r:id="rId4"/>
-    <p:sldLayoutId id="2147483653" r:id="rId5"/>
-    <p:sldLayoutId id="2147483654" r:id="rId6"/>
-    <p:sldLayoutId id="2147483655" r:id="rId7"/>
-    <p:sldLayoutId id="2147483656" r:id="rId8"/>
-    <p:sldLayoutId id="2147483657" r:id="rId9"/>
-    <p:sldLayoutId id="2147483658" r:id="rId10"/>
-    <p:sldLayoutId id="2147483659" r:id="rId11"/>
+    <p:sldLayoutId id="2147483673" r:id="rId1"/>
+    <p:sldLayoutId id="2147483674" r:id="rId2"/>
+    <p:sldLayoutId id="2147483675" r:id="rId3"/>
+    <p:sldLayoutId id="2147483676" r:id="rId4"/>
+    <p:sldLayoutId id="2147483677" r:id="rId5"/>
+    <p:sldLayoutId id="2147483678" r:id="rId6"/>
+    <p:sldLayoutId id="2147483679" r:id="rId7"/>
+    <p:sldLayoutId id="2147483680" r:id="rId8"/>
+    <p:sldLayoutId id="2147483681" r:id="rId9"/>
+    <p:sldLayoutId id="2147483682" r:id="rId10"/>
+    <p:sldLayoutId id="2147483683" r:id="rId11"/>
   </p:sldLayoutIdLst>
   <p:txStyles>
     <p:titleStyle>
-      <a:lvl1pPr algn="ctr" defTabSz="914400" rtl="0" eaLnBrk="1" latinLnBrk="0" hangingPunct="1">
+      <a:lvl1pPr algn="l" defTabSz="914400" rtl="0" eaLnBrk="1" latinLnBrk="0" hangingPunct="1">
         <a:spcBef>
           <a:spcPct val="0"/>
         </a:spcBef>
         <a:buNone/>
-        <a:defRPr sz="4400" kern="1200">
+        <a:defRPr sz="4000" kern="1200" spc="-100" baseline="0">
           <a:solidFill>
-            <a:schemeClr val="tx1"/>
+            <a:schemeClr val="tx2"/>
           </a:solidFill>
           <a:latin typeface="+mj-lt"/>
           <a:ea typeface="+mj-ea"/>
@@ -2850,40 +3105,14 @@
       </a:lvl1pPr>
     </p:titleStyle>
     <p:bodyStyle>
-      <a:lvl1pPr marL="342900" indent="-342900" algn="l" defTabSz="914400" rtl="0" eaLnBrk="1" latinLnBrk="0" hangingPunct="1">
+      <a:lvl1pPr marL="182880" indent="-182880" algn="l" defTabSz="914400" rtl="0" eaLnBrk="1" latinLnBrk="0" hangingPunct="1">
         <a:spcBef>
           <a:spcPct val="20000"/>
         </a:spcBef>
-        <a:buFont typeface="Arial" pitchFamily="34" charset="0"/>
-        <a:buChar char="•"/>
-        <a:defRPr sz="3200" kern="1200">
-          <a:solidFill>
-            <a:schemeClr val="tx1"/>
-          </a:solidFill>
-          <a:latin typeface="+mn-lt"/>
-          <a:ea typeface="+mn-ea"/>
-          <a:cs typeface="+mn-cs"/>
-        </a:defRPr>
-      </a:lvl1pPr>
-      <a:lvl2pPr marL="742950" indent="-285750" algn="l" defTabSz="914400" rtl="0" eaLnBrk="1" latinLnBrk="0" hangingPunct="1">
-        <a:spcBef>
-          <a:spcPct val="20000"/>
-        </a:spcBef>
-        <a:buFont typeface="Arial" pitchFamily="34" charset="0"/>
-        <a:buChar char="–"/>
-        <a:defRPr sz="2800" kern="1200">
-          <a:solidFill>
-            <a:schemeClr val="tx1"/>
-          </a:solidFill>
-          <a:latin typeface="+mn-lt"/>
-          <a:ea typeface="+mn-ea"/>
-          <a:cs typeface="+mn-cs"/>
-        </a:defRPr>
-      </a:lvl2pPr>
-      <a:lvl3pPr marL="1143000" indent="-228600" algn="l" defTabSz="914400" rtl="0" eaLnBrk="1" latinLnBrk="0" hangingPunct="1">
-        <a:spcBef>
-          <a:spcPct val="20000"/>
-        </a:spcBef>
+        <a:buClr>
+          <a:schemeClr val="accent1"/>
+        </a:buClr>
+        <a:buSzPct val="85000"/>
         <a:buFont typeface="Arial" pitchFamily="34" charset="0"/>
         <a:buChar char="•"/>
         <a:defRPr sz="2400" kern="1200">
@@ -2894,41 +3123,15 @@
           <a:ea typeface="+mn-ea"/>
           <a:cs typeface="+mn-cs"/>
         </a:defRPr>
-      </a:lvl3pPr>
-      <a:lvl4pPr marL="1600200" indent="-228600" algn="l" defTabSz="914400" rtl="0" eaLnBrk="1" latinLnBrk="0" hangingPunct="1">
+      </a:lvl1pPr>
+      <a:lvl2pPr marL="457200" indent="-182880" algn="l" defTabSz="914400" rtl="0" eaLnBrk="1" latinLnBrk="0" hangingPunct="1">
         <a:spcBef>
           <a:spcPct val="20000"/>
         </a:spcBef>
-        <a:buFont typeface="Arial" pitchFamily="34" charset="0"/>
-        <a:buChar char="–"/>
-        <a:defRPr sz="2000" kern="1200">
-          <a:solidFill>
-            <a:schemeClr val="tx1"/>
-          </a:solidFill>
-          <a:latin typeface="+mn-lt"/>
-          <a:ea typeface="+mn-ea"/>
-          <a:cs typeface="+mn-cs"/>
-        </a:defRPr>
-      </a:lvl4pPr>
-      <a:lvl5pPr marL="2057400" indent="-228600" algn="l" defTabSz="914400" rtl="0" eaLnBrk="1" latinLnBrk="0" hangingPunct="1">
-        <a:spcBef>
-          <a:spcPct val="20000"/>
-        </a:spcBef>
-        <a:buFont typeface="Arial" pitchFamily="34" charset="0"/>
-        <a:buChar char="»"/>
-        <a:defRPr sz="2000" kern="1200">
-          <a:solidFill>
-            <a:schemeClr val="tx1"/>
-          </a:solidFill>
-          <a:latin typeface="+mn-lt"/>
-          <a:ea typeface="+mn-ea"/>
-          <a:cs typeface="+mn-cs"/>
-        </a:defRPr>
-      </a:lvl5pPr>
-      <a:lvl6pPr marL="2514600" indent="-228600" algn="l" defTabSz="914400" rtl="0" eaLnBrk="1" latinLnBrk="0" hangingPunct="1">
-        <a:spcBef>
-          <a:spcPct val="20000"/>
-        </a:spcBef>
+        <a:buClr>
+          <a:schemeClr val="accent1"/>
+        </a:buClr>
+        <a:buSzPct val="85000"/>
         <a:buFont typeface="Arial" pitchFamily="34" charset="0"/>
         <a:buChar char="•"/>
         <a:defRPr sz="2000" kern="1200">
@@ -2939,14 +3142,91 @@
           <a:ea typeface="+mn-ea"/>
           <a:cs typeface="+mn-cs"/>
         </a:defRPr>
-      </a:lvl6pPr>
-      <a:lvl7pPr marL="2971800" indent="-228600" algn="l" defTabSz="914400" rtl="0" eaLnBrk="1" latinLnBrk="0" hangingPunct="1">
+      </a:lvl2pPr>
+      <a:lvl3pPr marL="731520" indent="-182880" algn="l" defTabSz="914400" rtl="0" eaLnBrk="1" latinLnBrk="0" hangingPunct="1">
         <a:spcBef>
           <a:spcPct val="20000"/>
         </a:spcBef>
+        <a:buClr>
+          <a:schemeClr val="accent1"/>
+        </a:buClr>
+        <a:buSzPct val="90000"/>
         <a:buFont typeface="Arial" pitchFamily="34" charset="0"/>
         <a:buChar char="•"/>
-        <a:defRPr sz="2000" kern="1200">
+        <a:defRPr sz="1800" kern="1200">
+          <a:solidFill>
+            <a:schemeClr val="tx1"/>
+          </a:solidFill>
+          <a:latin typeface="+mn-lt"/>
+          <a:ea typeface="+mn-ea"/>
+          <a:cs typeface="+mn-cs"/>
+        </a:defRPr>
+      </a:lvl3pPr>
+      <a:lvl4pPr marL="1005840" indent="-182880" algn="l" defTabSz="914400" rtl="0" eaLnBrk="1" latinLnBrk="0" hangingPunct="1">
+        <a:spcBef>
+          <a:spcPct val="20000"/>
+        </a:spcBef>
+        <a:buClr>
+          <a:schemeClr val="accent1"/>
+        </a:buClr>
+        <a:buFont typeface="Arial" pitchFamily="34" charset="0"/>
+        <a:buChar char="•"/>
+        <a:defRPr sz="1600" kern="1200">
+          <a:solidFill>
+            <a:schemeClr val="tx1"/>
+          </a:solidFill>
+          <a:latin typeface="+mn-lt"/>
+          <a:ea typeface="+mn-ea"/>
+          <a:cs typeface="+mn-cs"/>
+        </a:defRPr>
+      </a:lvl4pPr>
+      <a:lvl5pPr marL="1188720" indent="-137160" algn="l" defTabSz="914400" rtl="0" eaLnBrk="1" latinLnBrk="0" hangingPunct="1">
+        <a:spcBef>
+          <a:spcPct val="20000"/>
+        </a:spcBef>
+        <a:buClr>
+          <a:schemeClr val="accent1"/>
+        </a:buClr>
+        <a:buSzPct val="100000"/>
+        <a:buFont typeface="Arial" pitchFamily="34" charset="0"/>
+        <a:buChar char="•"/>
+        <a:defRPr sz="1400" kern="1200" baseline="0">
+          <a:solidFill>
+            <a:schemeClr val="tx1"/>
+          </a:solidFill>
+          <a:latin typeface="+mn-lt"/>
+          <a:ea typeface="+mn-ea"/>
+          <a:cs typeface="+mn-cs"/>
+        </a:defRPr>
+      </a:lvl5pPr>
+      <a:lvl6pPr marL="1371600" indent="-182880" algn="l" defTabSz="914400" rtl="0" eaLnBrk="1" latinLnBrk="0" hangingPunct="1">
+        <a:spcBef>
+          <a:spcPct val="20000"/>
+        </a:spcBef>
+        <a:buClr>
+          <a:schemeClr val="accent1"/>
+        </a:buClr>
+        <a:buFont typeface="Arial" pitchFamily="34" charset="0"/>
+        <a:buChar char="•"/>
+        <a:defRPr sz="1300" kern="1200">
+          <a:solidFill>
+            <a:schemeClr val="tx1"/>
+          </a:solidFill>
+          <a:latin typeface="+mn-lt"/>
+          <a:ea typeface="+mn-ea"/>
+          <a:cs typeface="+mn-cs"/>
+        </a:defRPr>
+      </a:lvl6pPr>
+      <a:lvl7pPr marL="1554480" indent="-182880" algn="l" defTabSz="914400" rtl="0" eaLnBrk="1" latinLnBrk="0" hangingPunct="1">
+        <a:spcBef>
+          <a:spcPct val="20000"/>
+        </a:spcBef>
+        <a:buClr>
+          <a:schemeClr val="accent1"/>
+        </a:buClr>
+        <a:buFont typeface="Arial" pitchFamily="34" charset="0"/>
+        <a:buChar char="•"/>
+        <a:defRPr sz="1300" kern="1200">
           <a:solidFill>
             <a:schemeClr val="tx1"/>
           </a:solidFill>
@@ -2955,13 +3235,16 @@
           <a:cs typeface="+mn-cs"/>
         </a:defRPr>
       </a:lvl7pPr>
-      <a:lvl8pPr marL="3429000" indent="-228600" algn="l" defTabSz="914400" rtl="0" eaLnBrk="1" latinLnBrk="0" hangingPunct="1">
+      <a:lvl8pPr marL="1737360" indent="-182880" algn="l" defTabSz="914400" rtl="0" eaLnBrk="1" latinLnBrk="0" hangingPunct="1">
         <a:spcBef>
           <a:spcPct val="20000"/>
         </a:spcBef>
+        <a:buClr>
+          <a:schemeClr val="accent1"/>
+        </a:buClr>
         <a:buFont typeface="Arial" pitchFamily="34" charset="0"/>
         <a:buChar char="•"/>
-        <a:defRPr sz="2000" kern="1200">
+        <a:defRPr sz="1300" kern="1200">
           <a:solidFill>
             <a:schemeClr val="tx1"/>
           </a:solidFill>
@@ -2970,13 +3253,16 @@
           <a:cs typeface="+mn-cs"/>
         </a:defRPr>
       </a:lvl8pPr>
-      <a:lvl9pPr marL="3886200" indent="-228600" algn="l" defTabSz="914400" rtl="0" eaLnBrk="1" latinLnBrk="0" hangingPunct="1">
+      <a:lvl9pPr marL="1920240" indent="-182880" algn="l" defTabSz="914400" rtl="0" eaLnBrk="1" latinLnBrk="0" hangingPunct="1">
         <a:spcBef>
           <a:spcPct val="20000"/>
         </a:spcBef>
+        <a:buClr>
+          <a:schemeClr val="accent1"/>
+        </a:buClr>
         <a:buFont typeface="Arial" pitchFamily="34" charset="0"/>
         <a:buChar char="•"/>
-        <a:defRPr sz="2000" kern="1200">
+        <a:defRPr sz="1300" kern="1200">
           <a:solidFill>
             <a:schemeClr val="tx1"/>
           </a:solidFill>
@@ -2988,7 +3274,7 @@
     </p:bodyStyle>
     <p:otherStyle>
       <a:defPPr>
-        <a:defRPr lang="es-MX"/>
+        <a:defRPr lang="en-US"/>
       </a:defPPr>
       <a:lvl1pPr marL="0" algn="l" defTabSz="914400" rtl="0" eaLnBrk="1" latinLnBrk="0" hangingPunct="1">
         <a:defRPr sz="1800" kern="1200">
@@ -3121,7 +3407,66 @@
               <a:rPr lang="es-MX" dirty="0" smtClean="0"/>
               <a:t>JPPF</a:t>
             </a:r>
-            <a:endParaRPr lang="es-MX" dirty="0"/>
+            <a:br>
+              <a:rPr lang="es-MX" dirty="0" smtClean="0"/>
+            </a:br>
+            <a:r>
+              <a:rPr lang="es-MX" sz="2800" dirty="0" smtClean="0">
+                <a:solidFill>
+                  <a:schemeClr val="bg2">
+                    <a:lumMod val="75000"/>
+                  </a:schemeClr>
+                </a:solidFill>
+              </a:rPr>
+              <a:t>Java </a:t>
+            </a:r>
+            <a:r>
+              <a:rPr lang="es-MX" sz="2800" dirty="0" err="1" smtClean="0">
+                <a:solidFill>
+                  <a:schemeClr val="bg2">
+                    <a:lumMod val="75000"/>
+                  </a:schemeClr>
+                </a:solidFill>
+              </a:rPr>
+              <a:t>Parallel</a:t>
+            </a:r>
+            <a:r>
+              <a:rPr lang="es-MX" sz="2800" dirty="0">
+                <a:solidFill>
+                  <a:schemeClr val="bg2">
+                    <a:lumMod val="75000"/>
+                  </a:schemeClr>
+                </a:solidFill>
+              </a:rPr>
+              <a:t> </a:t>
+            </a:r>
+            <a:r>
+              <a:rPr lang="es-MX" sz="2800" dirty="0" err="1" smtClean="0">
+                <a:solidFill>
+                  <a:schemeClr val="bg2">
+                    <a:lumMod val="75000"/>
+                  </a:schemeClr>
+                </a:solidFill>
+              </a:rPr>
+              <a:t>Proccesing</a:t>
+            </a:r>
+            <a:r>
+              <a:rPr lang="es-MX" sz="2800" dirty="0" smtClean="0">
+                <a:solidFill>
+                  <a:schemeClr val="bg2">
+                    <a:lumMod val="75000"/>
+                  </a:schemeClr>
+                </a:solidFill>
+              </a:rPr>
+              <a:t>  Framework</a:t>
+            </a:r>
+            <a:endParaRPr lang="es-MX" dirty="0">
+              <a:solidFill>
+                <a:schemeClr val="bg2">
+                  <a:lumMod val="75000"/>
+                </a:schemeClr>
+              </a:solidFill>
+            </a:endParaRPr>
           </a:p>
         </p:txBody>
       </p:sp>
@@ -3140,6 +3485,10 @@
           <a:bodyPr/>
           <a:lstStyle/>
           <a:p>
+            <a:r>
+              <a:rPr lang="es-MX" dirty="0" smtClean="0"/>
+              <a:t>Sistemas distribuidos</a:t>
+            </a:r>
             <a:endParaRPr lang="es-MX" dirty="0"/>
           </a:p>
         </p:txBody>
@@ -3148,6 +3497,87 @@
     <p:extLst>
       <p:ext uri="{BB962C8B-B14F-4D97-AF65-F5344CB8AC3E}">
         <p14:creationId xmlns:p14="http://schemas.microsoft.com/office/powerpoint/2010/main" val="2614934101"/>
+      </p:ext>
+    </p:extLst>
+  </p:cSld>
+  <p:clrMapOvr>
+    <a:masterClrMapping/>
+  </p:clrMapOvr>
+  <p:timing>
+    <p:tnLst>
+      <p:par>
+        <p:cTn id="1" dur="indefinite" restart="never" nodeType="tmRoot"/>
+      </p:par>
+    </p:tnLst>
+  </p:timing>
+</p:sld>
+</file>
+
+<file path=ppt/slides/slide10.xml><?xml version="1.0" encoding="utf-8"?>
+<p:sld xmlns:a="http://schemas.openxmlformats.org/drawingml/2006/main" xmlns:r="http://schemas.openxmlformats.org/officeDocument/2006/relationships" xmlns:p="http://schemas.openxmlformats.org/presentationml/2006/main">
+  <p:cSld>
+    <p:spTree>
+      <p:nvGrpSpPr>
+        <p:cNvPr id="1" name=""/>
+        <p:cNvGrpSpPr/>
+        <p:nvPr/>
+      </p:nvGrpSpPr>
+      <p:grpSpPr>
+        <a:xfrm>
+          <a:off x="0" y="0"/>
+          <a:ext cx="0" cy="0"/>
+          <a:chOff x="0" y="0"/>
+          <a:chExt cx="0" cy="0"/>
+        </a:xfrm>
+      </p:grpSpPr>
+      <p:sp>
+        <p:nvSpPr>
+          <p:cNvPr id="2" name="1 Título"/>
+          <p:cNvSpPr>
+            <a:spLocks noGrp="1"/>
+          </p:cNvSpPr>
+          <p:nvPr>
+            <p:ph type="title"/>
+          </p:nvPr>
+        </p:nvSpPr>
+        <p:spPr/>
+        <p:txBody>
+          <a:bodyPr>
+            <a:normAutofit fontScale="90000"/>
+          </a:bodyPr>
+          <a:lstStyle/>
+          <a:p>
+            <a:r>
+              <a:rPr lang="es-MX" dirty="0" smtClean="0"/>
+              <a:t>Representación visual del tráfico en la red</a:t>
+            </a:r>
+            <a:endParaRPr lang="es-MX" dirty="0"/>
+          </a:p>
+        </p:txBody>
+      </p:sp>
+      <p:sp>
+        <p:nvSpPr>
+          <p:cNvPr id="3" name="2 Marcador de contenido"/>
+          <p:cNvSpPr>
+            <a:spLocks noGrp="1"/>
+          </p:cNvSpPr>
+          <p:nvPr>
+            <p:ph idx="1"/>
+          </p:nvPr>
+        </p:nvSpPr>
+        <p:spPr/>
+        <p:txBody>
+          <a:bodyPr/>
+          <a:lstStyle/>
+          <a:p>
+            <a:endParaRPr lang="es-MX"/>
+          </a:p>
+        </p:txBody>
+      </p:sp>
+    </p:spTree>
+    <p:extLst>
+      <p:ext uri="{BB962C8B-B14F-4D97-AF65-F5344CB8AC3E}">
+        <p14:creationId xmlns:p14="http://schemas.microsoft.com/office/powerpoint/2010/main" val="2408136318"/>
       </p:ext>
     </p:extLst>
   </p:cSld>
@@ -3219,6 +3649,16 @@
           <a:bodyPr/>
           <a:lstStyle/>
           <a:p>
+            <a:r>
+              <a:rPr lang="es-MX" dirty="0" smtClean="0"/>
+              <a:t>JPPF ejecuta tareas con una gran demanda de procesamiento en diferentes equipos con el fin de reducir tiempos.</a:t>
+            </a:r>
+          </a:p>
+          <a:p>
+            <a:r>
+              <a:rPr lang="es-MX" dirty="0" smtClean="0"/>
+              <a:t>Las aplicaciones se dividen en partes más pequeñas y son ejecutadas simultáneamente en diferentes máquinas.</a:t>
+            </a:r>
             <a:endParaRPr lang="es-MX" dirty="0"/>
           </a:p>
         </p:txBody>
@@ -3277,7 +3717,7 @@
           <a:p>
             <a:r>
               <a:rPr lang="es-MX" dirty="0" smtClean="0"/>
-              <a:t>Arquitecturas (Diseño)</a:t>
+              <a:t>¿Cómo funciona?</a:t>
             </a:r>
             <a:endParaRPr lang="es-MX" dirty="0"/>
           </a:p>
@@ -3298,6 +3738,77 @@
           <a:bodyPr/>
           <a:lstStyle/>
           <a:p>
+            <a:r>
+              <a:rPr lang="es-MX" b="1" dirty="0" smtClean="0"/>
+              <a:t>Divide una aplicación en pequeñas partes que pueden ser ejecutadas de forma independiente y en paralelo:</a:t>
+            </a:r>
+          </a:p>
+          <a:p>
+            <a:pPr lvl="1"/>
+            <a:r>
+              <a:rPr lang="es-MX" dirty="0" smtClean="0"/>
+              <a:t>El resultado es un objeto llamado «</a:t>
+            </a:r>
+            <a:r>
+              <a:rPr lang="es-MX" dirty="0" err="1" smtClean="0"/>
+              <a:t>job</a:t>
+            </a:r>
+            <a:r>
+              <a:rPr lang="es-MX" dirty="0" smtClean="0"/>
+              <a:t>» hecho de pequeñas partes llamadas «</a:t>
+            </a:r>
+            <a:r>
+              <a:rPr lang="es-MX" dirty="0" err="1" smtClean="0"/>
+              <a:t>tasks</a:t>
+            </a:r>
+            <a:r>
+              <a:rPr lang="es-MX" dirty="0" smtClean="0"/>
+              <a:t>».</a:t>
+            </a:r>
+          </a:p>
+          <a:p>
+            <a:pPr lvl="1"/>
+            <a:endParaRPr lang="es-MX" dirty="0"/>
+          </a:p>
+          <a:p>
+            <a:pPr lvl="1"/>
+            <a:endParaRPr lang="es-MX" dirty="0" smtClean="0"/>
+          </a:p>
+          <a:p>
+            <a:r>
+              <a:rPr lang="es-MX" b="1" dirty="0" smtClean="0"/>
+              <a:t>Ejecutando la aplicación en el JPPF </a:t>
+            </a:r>
+            <a:r>
+              <a:rPr lang="es-MX" b="1" dirty="0" err="1" smtClean="0"/>
+              <a:t>Grid</a:t>
+            </a:r>
+            <a:r>
+              <a:rPr lang="es-MX" b="1" dirty="0" smtClean="0"/>
+              <a:t>:</a:t>
+            </a:r>
+          </a:p>
+          <a:p>
+            <a:pPr lvl="1"/>
+            <a:r>
+              <a:rPr lang="es-MX" dirty="0" smtClean="0"/>
+              <a:t>La manera más simple es tener un servidor al que </a:t>
+            </a:r>
+            <a:r>
+              <a:rPr lang="es-MX" dirty="0" err="1" smtClean="0"/>
+              <a:t>estan</a:t>
+            </a:r>
+            <a:r>
+              <a:rPr lang="es-MX" dirty="0" smtClean="0"/>
+              <a:t> conectados varios nodos en ejecución.</a:t>
+            </a:r>
+          </a:p>
+          <a:p>
+            <a:pPr lvl="1"/>
+            <a:r>
+              <a:rPr lang="es-MX" dirty="0" smtClean="0"/>
+              <a:t>Un nodo es un componente de software de JPPF que normalmente se instala y ejecuta en un equipo diferente</a:t>
+            </a:r>
             <a:endParaRPr lang="es-MX" dirty="0"/>
           </a:p>
         </p:txBody>
@@ -3305,13 +3816,20 @@
     </p:spTree>
     <p:extLst>
       <p:ext uri="{BB962C8B-B14F-4D97-AF65-F5344CB8AC3E}">
-        <p14:creationId xmlns:p14="http://schemas.microsoft.com/office/powerpoint/2010/main" val="969114531"/>
+        <p14:creationId xmlns:p14="http://schemas.microsoft.com/office/powerpoint/2010/main" val="3571580893"/>
       </p:ext>
     </p:extLst>
   </p:cSld>
   <p:clrMapOvr>
     <a:masterClrMapping/>
   </p:clrMapOvr>
+  <p:timing>
+    <p:tnLst>
+      <p:par>
+        <p:cTn id="1" dur="indefinite" restart="never" nodeType="tmRoot"/>
+      </p:par>
+    </p:tnLst>
+  </p:timing>
 </p:sld>
 </file>
 
@@ -3349,7 +3867,7 @@
           <a:p>
             <a:r>
               <a:rPr lang="es-MX" dirty="0" smtClean="0"/>
-              <a:t>Instalación</a:t>
+              <a:t>Arquitecturas (Diseño)</a:t>
             </a:r>
             <a:endParaRPr lang="es-MX" dirty="0"/>
           </a:p>
@@ -3370,20 +3888,52 @@
           <a:bodyPr/>
           <a:lstStyle/>
           <a:p>
-            <a:endParaRPr lang="es-MX"/>
+            <a:r>
+              <a:rPr lang="es-MX" dirty="0" smtClean="0"/>
+              <a:t>Arquitectura Maestro / Esclavo:</a:t>
+            </a:r>
+          </a:p>
+          <a:p>
+            <a:pPr lvl="1"/>
+            <a:r>
+              <a:rPr lang="es-MX" dirty="0" smtClean="0"/>
+              <a:t>El trabajo es distribuido por el servidor (maestro) a los nodos (esclavos).</a:t>
+            </a:r>
+          </a:p>
+          <a:p>
+            <a:pPr lvl="1"/>
+            <a:r>
+              <a:rPr lang="es-MX" dirty="0" smtClean="0"/>
+              <a:t>Las tareas de un trabajo son distribuidas a los nodos en ejecución.</a:t>
+            </a:r>
+          </a:p>
+          <a:p>
+            <a:pPr lvl="1"/>
+            <a:endParaRPr lang="es-MX" dirty="0"/>
+          </a:p>
+          <a:p>
+            <a:pPr lvl="1"/>
+            <a:endParaRPr lang="es-MX" dirty="0" smtClean="0"/>
           </a:p>
         </p:txBody>
       </p:sp>
     </p:spTree>
     <p:extLst>
       <p:ext uri="{BB962C8B-B14F-4D97-AF65-F5344CB8AC3E}">
-        <p14:creationId xmlns:p14="http://schemas.microsoft.com/office/powerpoint/2010/main" val="738099653"/>
+        <p14:creationId xmlns:p14="http://schemas.microsoft.com/office/powerpoint/2010/main" val="969114531"/>
       </p:ext>
     </p:extLst>
   </p:cSld>
   <p:clrMapOvr>
     <a:masterClrMapping/>
   </p:clrMapOvr>
+  <p:timing>
+    <p:tnLst>
+      <p:par>
+        <p:cTn id="1" dur="indefinite" restart="never" nodeType="tmRoot"/>
+      </p:par>
+    </p:tnLst>
+  </p:timing>
 </p:sld>
 </file>
 
@@ -3421,41 +3971,182 @@
           <a:p>
             <a:r>
               <a:rPr lang="es-MX" dirty="0" smtClean="0"/>
-              <a:t>Caso aplicativo</a:t>
+              <a:t>Arquitectura (vista de alto nivel)</a:t>
             </a:r>
             <a:endParaRPr lang="es-MX" dirty="0"/>
           </a:p>
         </p:txBody>
       </p:sp>
-      <p:sp>
-        <p:nvSpPr>
-          <p:cNvPr id="3" name="2 Marcador de contenido"/>
-          <p:cNvSpPr>
-            <a:spLocks noGrp="1"/>
-          </p:cNvSpPr>
+      <p:pic>
+        <p:nvPicPr>
+          <p:cNvPr id="4" name="3 Marcador de contenido"/>
+          <p:cNvPicPr>
+            <a:picLocks noGrp="1" noChangeAspect="1"/>
+          </p:cNvPicPr>
           <p:nvPr>
             <p:ph idx="1"/>
           </p:nvPr>
-        </p:nvSpPr>
-        <p:spPr/>
-        <p:txBody>
-          <a:bodyPr/>
-          <a:lstStyle/>
-          <a:p>
-            <a:endParaRPr lang="es-MX"/>
+        </p:nvPicPr>
+        <p:blipFill>
+          <a:blip r:embed="rId2">
+            <a:extLst>
+              <a:ext uri="{28A0092B-C50C-407E-A947-70E740481C1C}">
+                <a14:useLocalDpi xmlns:a14="http://schemas.microsoft.com/office/drawing/2010/main" val="0"/>
+              </a:ext>
+            </a:extLst>
+          </a:blip>
+          <a:stretch>
+            <a:fillRect/>
+          </a:stretch>
+        </p:blipFill>
+        <p:spPr>
+          <a:xfrm>
+            <a:off x="395536" y="1484784"/>
+            <a:ext cx="4615966" cy="4876800"/>
+          </a:xfrm>
+          <a:prstGeom prst="rect">
+            <a:avLst/>
+          </a:prstGeom>
+        </p:spPr>
+      </p:pic>
+      <p:sp>
+        <p:nvSpPr>
+          <p:cNvPr id="6" name="5 CuadroTexto"/>
+          <p:cNvSpPr txBox="1"/>
+          <p:nvPr/>
+        </p:nvSpPr>
+        <p:spPr>
+          <a:xfrm>
+            <a:off x="5364088" y="1844824"/>
+            <a:ext cx="3384376" cy="6894195"/>
+          </a:xfrm>
+          <a:prstGeom prst="rect">
+            <a:avLst/>
+          </a:prstGeom>
+          <a:noFill/>
+        </p:spPr>
+        <p:txBody>
+          <a:bodyPr wrap="square" rtlCol="0">
+            <a:spAutoFit/>
+          </a:bodyPr>
+          <a:lstStyle/>
+          <a:p>
+            <a:r>
+              <a:rPr lang="es-MX" sz="1400" dirty="0" smtClean="0"/>
+              <a:t>Esta dividida en 3 capas:</a:t>
+            </a:r>
+          </a:p>
+          <a:p>
+            <a:r>
+              <a:rPr lang="es-MX" sz="1400" b="1" dirty="0" smtClean="0"/>
+              <a:t>Cliente</a:t>
+            </a:r>
+            <a:r>
+              <a:rPr lang="es-MX" sz="1400" dirty="0" smtClean="0"/>
+              <a:t>: Proporciona un API y herramientas de comunicación  que usa el </a:t>
+            </a:r>
+            <a:r>
+              <a:rPr lang="es-MX" sz="1400" dirty="0" err="1" smtClean="0"/>
+              <a:t>framework</a:t>
+            </a:r>
+            <a:r>
+              <a:rPr lang="es-MX" sz="1400" dirty="0" smtClean="0"/>
+              <a:t> para enviar tareas y ser ejecutadas en paralelo.</a:t>
+            </a:r>
+          </a:p>
+          <a:p>
+            <a:endParaRPr lang="es-MX" sz="1400" dirty="0" smtClean="0"/>
+          </a:p>
+          <a:p>
+            <a:r>
+              <a:rPr lang="es-MX" sz="1400" b="1" dirty="0" smtClean="0"/>
+              <a:t>Servicio</a:t>
+            </a:r>
+            <a:r>
+              <a:rPr lang="es-MX" sz="1400" dirty="0" smtClean="0"/>
+              <a:t>: Responsable de la comunicación entre clientes y nodos. A través de la cola de ejecución, el balanceo de carga y recuperación de características y la carga dinámica del </a:t>
+            </a:r>
+            <a:r>
+              <a:rPr lang="es-MX" sz="1400" dirty="0" err="1" smtClean="0"/>
+              <a:t>framework</a:t>
+            </a:r>
+            <a:r>
+              <a:rPr lang="es-MX" sz="1400" dirty="0" smtClean="0"/>
+              <a:t> y las clases en los apropiados nodos.</a:t>
+            </a:r>
+          </a:p>
+          <a:p>
+            <a:endParaRPr lang="es-MX" sz="1400" dirty="0"/>
+          </a:p>
+          <a:p>
+            <a:r>
+              <a:rPr lang="es-MX" sz="1400" b="1" dirty="0" smtClean="0"/>
+              <a:t>Ejecución</a:t>
+            </a:r>
+            <a:r>
+              <a:rPr lang="es-MX" sz="1400" dirty="0" smtClean="0"/>
+              <a:t>: Aquí se encuentras los nodos. Ellos ejecutan tareas individuales, regresan el resultado de la ejecución solicitan dinámicamente, desde el </a:t>
+            </a:r>
+            <a:r>
+              <a:rPr lang="es-MX" sz="1400" smtClean="0"/>
+              <a:t>driver JPPF </a:t>
+            </a:r>
+            <a:r>
+              <a:rPr lang="es-MX" sz="1400" dirty="0" smtClean="0"/>
+              <a:t>el código que ellos necesitan ejecutar en </a:t>
+            </a:r>
+            <a:r>
+              <a:rPr lang="es-MX" sz="1400" smtClean="0"/>
+              <a:t>los clientes.</a:t>
+            </a:r>
+            <a:endParaRPr lang="es-MX" sz="1400" dirty="0"/>
+          </a:p>
+          <a:p>
+            <a:endParaRPr lang="es-MX" dirty="0" smtClean="0"/>
+          </a:p>
+          <a:p>
+            <a:endParaRPr lang="es-MX" dirty="0"/>
+          </a:p>
+          <a:p>
+            <a:endParaRPr lang="es-MX" dirty="0" smtClean="0"/>
+          </a:p>
+          <a:p>
+            <a:endParaRPr lang="es-MX" dirty="0"/>
+          </a:p>
+          <a:p>
+            <a:endParaRPr lang="es-MX" dirty="0" smtClean="0"/>
+          </a:p>
+          <a:p>
+            <a:endParaRPr lang="es-MX" dirty="0"/>
+          </a:p>
+          <a:p>
+            <a:endParaRPr lang="es-MX" dirty="0" smtClean="0"/>
+          </a:p>
+          <a:p>
+            <a:endParaRPr lang="es-MX" dirty="0"/>
+          </a:p>
+          <a:p>
+            <a:endParaRPr lang="es-MX" dirty="0" smtClean="0"/>
           </a:p>
         </p:txBody>
       </p:sp>
     </p:spTree>
     <p:extLst>
       <p:ext uri="{BB962C8B-B14F-4D97-AF65-F5344CB8AC3E}">
-        <p14:creationId xmlns:p14="http://schemas.microsoft.com/office/powerpoint/2010/main" val="2125470112"/>
+        <p14:creationId xmlns:p14="http://schemas.microsoft.com/office/powerpoint/2010/main" val="687389289"/>
       </p:ext>
     </p:extLst>
   </p:cSld>
   <p:clrMapOvr>
     <a:masterClrMapping/>
   </p:clrMapOvr>
+  <p:timing>
+    <p:tnLst>
+      <p:par>
+        <p:cTn id="1" dur="indefinite" restart="never" nodeType="tmRoot"/>
+      </p:par>
+    </p:tnLst>
+  </p:timing>
 </p:sld>
 </file>
 
@@ -3493,7 +4184,7 @@
           <a:p>
             <a:r>
               <a:rPr lang="es-MX" dirty="0" smtClean="0"/>
-              <a:t>Conclusiones</a:t>
+              <a:t>Instalación</a:t>
             </a:r>
             <a:endParaRPr lang="es-MX" dirty="0"/>
           </a:p>
@@ -3521,7 +4212,7 @@
     </p:spTree>
     <p:extLst>
       <p:ext uri="{BB962C8B-B14F-4D97-AF65-F5344CB8AC3E}">
-        <p14:creationId xmlns:p14="http://schemas.microsoft.com/office/powerpoint/2010/main" val="2764883543"/>
+        <p14:creationId xmlns:p14="http://schemas.microsoft.com/office/powerpoint/2010/main" val="738099653"/>
       </p:ext>
     </p:extLst>
   </p:cSld>
@@ -3560,14 +4251,12 @@
         </p:nvSpPr>
         <p:spPr/>
         <p:txBody>
-          <a:bodyPr>
-            <a:normAutofit fontScale="90000"/>
-          </a:bodyPr>
+          <a:bodyPr/>
           <a:lstStyle/>
           <a:p>
             <a:r>
               <a:rPr lang="es-MX" dirty="0" smtClean="0"/>
-              <a:t>¿Qué pasa si agregamos o quitamos nodos?</a:t>
+              <a:t>Caso aplicativo</a:t>
             </a:r>
             <a:endParaRPr lang="es-MX" dirty="0"/>
           </a:p>
@@ -3588,14 +4277,14 @@
           <a:bodyPr/>
           <a:lstStyle/>
           <a:p>
-            <a:endParaRPr lang="es-MX" dirty="0"/>
+            <a:endParaRPr lang="es-MX"/>
           </a:p>
         </p:txBody>
       </p:sp>
     </p:spTree>
     <p:extLst>
       <p:ext uri="{BB962C8B-B14F-4D97-AF65-F5344CB8AC3E}">
-        <p14:creationId xmlns:p14="http://schemas.microsoft.com/office/powerpoint/2010/main" val="1397610341"/>
+        <p14:creationId xmlns:p14="http://schemas.microsoft.com/office/powerpoint/2010/main" val="2125470112"/>
       </p:ext>
     </p:extLst>
   </p:cSld>
@@ -3634,6 +4323,78 @@
         </p:nvSpPr>
         <p:spPr/>
         <p:txBody>
+          <a:bodyPr/>
+          <a:lstStyle/>
+          <a:p>
+            <a:r>
+              <a:rPr lang="es-MX" dirty="0" smtClean="0"/>
+              <a:t>Conclusiones</a:t>
+            </a:r>
+            <a:endParaRPr lang="es-MX" dirty="0"/>
+          </a:p>
+        </p:txBody>
+      </p:sp>
+      <p:sp>
+        <p:nvSpPr>
+          <p:cNvPr id="3" name="2 Marcador de contenido"/>
+          <p:cNvSpPr>
+            <a:spLocks noGrp="1"/>
+          </p:cNvSpPr>
+          <p:nvPr>
+            <p:ph idx="1"/>
+          </p:nvPr>
+        </p:nvSpPr>
+        <p:spPr/>
+        <p:txBody>
+          <a:bodyPr/>
+          <a:lstStyle/>
+          <a:p>
+            <a:endParaRPr lang="es-MX"/>
+          </a:p>
+        </p:txBody>
+      </p:sp>
+    </p:spTree>
+    <p:extLst>
+      <p:ext uri="{BB962C8B-B14F-4D97-AF65-F5344CB8AC3E}">
+        <p14:creationId xmlns:p14="http://schemas.microsoft.com/office/powerpoint/2010/main" val="2764883543"/>
+      </p:ext>
+    </p:extLst>
+  </p:cSld>
+  <p:clrMapOvr>
+    <a:masterClrMapping/>
+  </p:clrMapOvr>
+</p:sld>
+</file>
+
+<file path=ppt/slides/slide9.xml><?xml version="1.0" encoding="utf-8"?>
+<p:sld xmlns:a="http://schemas.openxmlformats.org/drawingml/2006/main" xmlns:r="http://schemas.openxmlformats.org/officeDocument/2006/relationships" xmlns:p="http://schemas.openxmlformats.org/presentationml/2006/main">
+  <p:cSld>
+    <p:spTree>
+      <p:nvGrpSpPr>
+        <p:cNvPr id="1" name=""/>
+        <p:cNvGrpSpPr/>
+        <p:nvPr/>
+      </p:nvGrpSpPr>
+      <p:grpSpPr>
+        <a:xfrm>
+          <a:off x="0" y="0"/>
+          <a:ext cx="0" cy="0"/>
+          <a:chOff x="0" y="0"/>
+          <a:chExt cx="0" cy="0"/>
+        </a:xfrm>
+      </p:grpSpPr>
+      <p:sp>
+        <p:nvSpPr>
+          <p:cNvPr id="2" name="1 Título"/>
+          <p:cNvSpPr>
+            <a:spLocks noGrp="1"/>
+          </p:cNvSpPr>
+          <p:nvPr>
+            <p:ph type="title"/>
+          </p:nvPr>
+        </p:nvSpPr>
+        <p:spPr/>
+        <p:txBody>
           <a:bodyPr>
             <a:normAutofit fontScale="90000"/>
           </a:bodyPr>
@@ -3641,7 +4402,7 @@
           <a:p>
             <a:r>
               <a:rPr lang="es-MX" dirty="0" smtClean="0"/>
-              <a:t>Representación visual del tráfico en la red</a:t>
+              <a:t>¿Qué pasa si agregamos o quitamos nodos?</a:t>
             </a:r>
             <a:endParaRPr lang="es-MX" dirty="0"/>
           </a:p>
@@ -3662,14 +4423,14 @@
           <a:bodyPr/>
           <a:lstStyle/>
           <a:p>
-            <a:endParaRPr lang="es-MX"/>
+            <a:endParaRPr lang="es-MX" dirty="0"/>
           </a:p>
         </p:txBody>
       </p:sp>
     </p:spTree>
     <p:extLst>
       <p:ext uri="{BB962C8B-B14F-4D97-AF65-F5344CB8AC3E}">
-        <p14:creationId xmlns:p14="http://schemas.microsoft.com/office/powerpoint/2010/main" val="2408136318"/>
+        <p14:creationId xmlns:p14="http://schemas.microsoft.com/office/powerpoint/2010/main" val="1397610341"/>
       </p:ext>
     </p:extLst>
   </p:cSld>
@@ -3680,38 +4441,38 @@
 </file>
 
 <file path=ppt/theme/theme1.xml><?xml version="1.0" encoding="utf-8"?>
-<a:theme xmlns:a="http://schemas.openxmlformats.org/drawingml/2006/main" name="Tema de Office">
+<a:theme xmlns:a="http://schemas.openxmlformats.org/drawingml/2006/main" name="Claridad">
   <a:themeElements>
-    <a:clrScheme name="Office">
+    <a:clrScheme name="Claridad">
       <a:dk1>
-        <a:sysClr val="windowText" lastClr="000000"/>
+        <a:srgbClr val="292934"/>
       </a:dk1>
       <a:lt1>
-        <a:sysClr val="window" lastClr="FFFFFF"/>
+        <a:srgbClr val="FFFFFF"/>
       </a:lt1>
       <a:dk2>
-        <a:srgbClr val="1F497D"/>
+        <a:srgbClr val="D2533C"/>
       </a:dk2>
       <a:lt2>
-        <a:srgbClr val="EEECE1"/>
+        <a:srgbClr val="F3F2DC"/>
       </a:lt2>
       <a:accent1>
-        <a:srgbClr val="4F81BD"/>
+        <a:srgbClr val="93A299"/>
       </a:accent1>
       <a:accent2>
-        <a:srgbClr val="C0504D"/>
+        <a:srgbClr val="AD8F67"/>
       </a:accent2>
       <a:accent3>
-        <a:srgbClr val="9BBB59"/>
+        <a:srgbClr val="726056"/>
       </a:accent3>
       <a:accent4>
-        <a:srgbClr val="8064A2"/>
+        <a:srgbClr val="4C5A6A"/>
       </a:accent4>
       <a:accent5>
-        <a:srgbClr val="4BACC6"/>
+        <a:srgbClr val="808DA0"/>
       </a:accent5>
       <a:accent6>
-        <a:srgbClr val="F79646"/>
+        <a:srgbClr val="79463D"/>
       </a:accent6>
       <a:hlink>
         <a:srgbClr val="0000FF"/>
@@ -3720,22 +4481,22 @@
         <a:srgbClr val="800080"/>
       </a:folHlink>
     </a:clrScheme>
-    <a:fontScheme name="Office">
+    <a:fontScheme name="Clásico de Office 2">
       <a:majorFont>
-        <a:latin typeface="Calibri"/>
+        <a:latin typeface="Arial"/>
         <a:ea typeface=""/>
         <a:cs typeface=""/>
         <a:font script="Jpan" typeface="ＭＳ Ｐゴシック"/>
-        <a:font script="Hang" typeface="맑은 고딕"/>
-        <a:font script="Hans" typeface="宋体"/>
-        <a:font script="Hant" typeface="新細明體"/>
-        <a:font script="Arab" typeface="Times New Roman"/>
-        <a:font script="Hebr" typeface="Times New Roman"/>
-        <a:font script="Thai" typeface="Angsana New"/>
+        <a:font script="Hang" typeface="돋움"/>
+        <a:font script="Hans" typeface="方正舒体"/>
+        <a:font script="Hant" typeface="微軟正黑體"/>
+        <a:font script="Arab" typeface="Arial"/>
+        <a:font script="Hebr" typeface="Arial"/>
+        <a:font script="Thai" typeface="Cordia New"/>
         <a:font script="Ethi" typeface="Nyala"/>
         <a:font script="Beng" typeface="Vrinda"/>
         <a:font script="Gujr" typeface="Shruti"/>
-        <a:font script="Khmr" typeface="MoolBoran"/>
+        <a:font script="Khmr" typeface="DaunPenh"/>
         <a:font script="Knda" typeface="Tunga"/>
         <a:font script="Guru" typeface="Raavi"/>
         <a:font script="Cans" typeface="Euphemia"/>
@@ -3752,18 +4513,18 @@
         <a:font script="Laoo" typeface="DokChampa"/>
         <a:font script="Sinh" typeface="Iskoola Pota"/>
         <a:font script="Mong" typeface="Mongolian Baiti"/>
-        <a:font script="Viet" typeface="Times New Roman"/>
+        <a:font script="Viet" typeface="Arial"/>
         <a:font script="Uigh" typeface="Microsoft Uighur"/>
         <a:font script="Geor" typeface="Sylfaen"/>
       </a:majorFont>
       <a:minorFont>
-        <a:latin typeface="Calibri"/>
+        <a:latin typeface="Arial"/>
         <a:ea typeface=""/>
         <a:cs typeface=""/>
         <a:font script="Jpan" typeface="ＭＳ Ｐゴシック"/>
-        <a:font script="Hang" typeface="맑은 고딕"/>
-        <a:font script="Hans" typeface="宋体"/>
-        <a:font script="Hant" typeface="新細明體"/>
+        <a:font script="Hang" typeface="돋움"/>
+        <a:font script="Hans" typeface="方正舒体"/>
+        <a:font script="Hant" typeface="微軟正黑體"/>
         <a:font script="Arab" typeface="Arial"/>
         <a:font script="Hebr" typeface="Arial"/>
         <a:font script="Thai" typeface="Cordia New"/>
@@ -3792,7 +4553,7 @@
         <a:font script="Geor" typeface="Sylfaen"/>
       </a:minorFont>
     </a:fontScheme>
-    <a:fmtScheme name="Office">
+    <a:fmtScheme name="Claridad">
       <a:fillStyleLst>
         <a:solidFill>
           <a:schemeClr val="phClr"/>
@@ -3802,65 +4563,75 @@
             <a:gs pos="0">
               <a:schemeClr val="phClr">
                 <a:tint val="50000"/>
-                <a:satMod val="300000"/>
+                <a:shade val="86000"/>
+                <a:satMod val="140000"/>
               </a:schemeClr>
             </a:gs>
-            <a:gs pos="35000">
+            <a:gs pos="45000">
               <a:schemeClr val="phClr">
-                <a:tint val="37000"/>
-                <a:satMod val="300000"/>
+                <a:tint val="48000"/>
+                <a:satMod val="150000"/>
               </a:schemeClr>
             </a:gs>
             <a:gs pos="100000">
               <a:schemeClr val="phClr">
-                <a:tint val="15000"/>
-                <a:satMod val="350000"/>
+                <a:tint val="28000"/>
+                <a:satMod val="160000"/>
               </a:schemeClr>
             </a:gs>
           </a:gsLst>
-          <a:lin ang="16200000" scaled="1"/>
+          <a:path path="circle">
+            <a:fillToRect l="100000" t="100000" r="100000" b="100000"/>
+          </a:path>
         </a:gradFill>
         <a:gradFill rotWithShape="1">
           <a:gsLst>
             <a:gs pos="0">
               <a:schemeClr val="phClr">
-                <a:shade val="51000"/>
-                <a:satMod val="130000"/>
+                <a:shade val="70000"/>
+                <a:satMod val="150000"/>
               </a:schemeClr>
             </a:gs>
-            <a:gs pos="80000">
+            <a:gs pos="34000">
               <a:schemeClr val="phClr">
-                <a:shade val="93000"/>
-                <a:satMod val="130000"/>
+                <a:shade val="70000"/>
+                <a:satMod val="140000"/>
+              </a:schemeClr>
+            </a:gs>
+            <a:gs pos="70000">
+              <a:schemeClr val="phClr">
+                <a:tint val="100000"/>
+                <a:shade val="90000"/>
+                <a:satMod val="140000"/>
               </a:schemeClr>
             </a:gs>
             <a:gs pos="100000">
               <a:schemeClr val="phClr">
-                <a:shade val="94000"/>
-                <a:satMod val="135000"/>
+                <a:tint val="100000"/>
+                <a:shade val="100000"/>
+                <a:satMod val="100000"/>
               </a:schemeClr>
             </a:gs>
           </a:gsLst>
-          <a:lin ang="16200000" scaled="0"/>
+          <a:path path="circle">
+            <a:fillToRect l="100000" t="100000" r="100000" b="100000"/>
+          </a:path>
         </a:gradFill>
       </a:fillStyleLst>
       <a:lnStyleLst>
         <a:ln w="9525" cap="flat" cmpd="sng" algn="ctr">
           <a:solidFill>
-            <a:schemeClr val="phClr">
-              <a:shade val="95000"/>
-              <a:satMod val="105000"/>
-            </a:schemeClr>
+            <a:schemeClr val="phClr"/>
           </a:solidFill>
           <a:prstDash val="solid"/>
         </a:ln>
-        <a:ln w="25400" cap="flat" cmpd="sng" algn="ctr">
+        <a:ln w="26425" cap="flat" cmpd="sng" algn="ctr">
           <a:solidFill>
             <a:schemeClr val="phClr"/>
           </a:solidFill>
           <a:prstDash val="solid"/>
         </a:ln>
-        <a:ln w="38100" cap="flat" cmpd="sng" algn="ctr">
+        <a:ln w="44450" cap="flat" cmpd="sng" algn="ctr">
           <a:solidFill>
             <a:schemeClr val="phClr"/>
           </a:solidFill>
@@ -3869,28 +4640,22 @@
       </a:lnStyleLst>
       <a:effectStyleLst>
         <a:effectStyle>
+          <a:effectLst/>
+        </a:effectStyle>
+        <a:effectStyle>
           <a:effectLst>
-            <a:outerShdw blurRad="40000" dist="20000" dir="5400000" rotWithShape="0">
+            <a:outerShdw blurRad="38100" dist="25400" dir="2700000" algn="br" rotWithShape="0">
               <a:srgbClr val="000000">
-                <a:alpha val="38000"/>
+                <a:alpha val="60000"/>
               </a:srgbClr>
             </a:outerShdw>
           </a:effectLst>
         </a:effectStyle>
         <a:effectStyle>
           <a:effectLst>
-            <a:outerShdw blurRad="40000" dist="23000" dir="5400000" rotWithShape="0">
+            <a:outerShdw blurRad="38100" dist="25400" dir="2700000" algn="br" rotWithShape="0">
               <a:srgbClr val="000000">
-                <a:alpha val="35000"/>
-              </a:srgbClr>
-            </a:outerShdw>
-          </a:effectLst>
-        </a:effectStyle>
-        <a:effectStyle>
-          <a:effectLst>
-            <a:outerShdw blurRad="40000" dist="23000" dir="5400000" rotWithShape="0">
-              <a:srgbClr val="000000">
-                <a:alpha val="35000"/>
+                <a:alpha val="60000"/>
               </a:srgbClr>
             </a:outerShdw>
           </a:effectLst>
@@ -3898,12 +4663,18 @@
             <a:camera prst="orthographicFront">
               <a:rot lat="0" lon="0" rev="0"/>
             </a:camera>
-            <a:lightRig rig="threePt" dir="t">
-              <a:rot lat="0" lon="0" rev="1200000"/>
+            <a:lightRig rig="balanced" dir="t">
+              <a:rot lat="0" lon="0" rev="5100000"/>
             </a:lightRig>
           </a:scene3d>
-          <a:sp3d>
-            <a:bevelT w="63500" h="25400"/>
+          <a:sp3d contourW="6350">
+            <a:bevelT w="29210" h="12700"/>
+            <a:contourClr>
+              <a:schemeClr val="phClr">
+                <a:shade val="30000"/>
+                <a:satMod val="130000"/>
+              </a:schemeClr>
+            </a:contourClr>
           </a:sp3d>
         </a:effectStyle>
       </a:effectStyleLst>
@@ -3915,47 +4686,40 @@
           <a:gsLst>
             <a:gs pos="0">
               <a:schemeClr val="phClr">
-                <a:tint val="40000"/>
-                <a:satMod val="350000"/>
+                <a:tint val="85000"/>
+                <a:satMod val="180000"/>
               </a:schemeClr>
             </a:gs>
             <a:gs pos="40000">
               <a:schemeClr val="phClr">
-                <a:tint val="45000"/>
-                <a:shade val="99000"/>
-                <a:satMod val="350000"/>
+                <a:tint val="95000"/>
+                <a:shade val="85000"/>
+                <a:satMod val="150000"/>
               </a:schemeClr>
             </a:gs>
             <a:gs pos="100000">
               <a:schemeClr val="phClr">
-                <a:shade val="20000"/>
-                <a:satMod val="255000"/>
-              </a:schemeClr>
-            </a:gs>
-          </a:gsLst>
-          <a:path path="circle">
-            <a:fillToRect l="50000" t="-80000" r="50000" b="180000"/>
-          </a:path>
-        </a:gradFill>
-        <a:gradFill rotWithShape="1">
-          <a:gsLst>
-            <a:gs pos="0">
-              <a:schemeClr val="phClr">
-                <a:tint val="80000"/>
-                <a:satMod val="300000"/>
-              </a:schemeClr>
-            </a:gs>
-            <a:gs pos="100000">
-              <a:schemeClr val="phClr">
-                <a:shade val="30000"/>
+                <a:shade val="45000"/>
                 <a:satMod val="200000"/>
               </a:schemeClr>
             </a:gs>
           </a:gsLst>
-          <a:path path="circle">
-            <a:fillToRect l="50000" t="50000" r="50000" b="50000"/>
-          </a:path>
+          <a:lin ang="5400000" scaled="0"/>
         </a:gradFill>
+        <a:blipFill rotWithShape="1">
+          <a:blip xmlns:r="http://schemas.openxmlformats.org/officeDocument/2006/relationships" r:embed="rId1">
+            <a:duotone>
+              <a:schemeClr val="phClr">
+                <a:shade val="55000"/>
+              </a:schemeClr>
+              <a:schemeClr val="phClr">
+                <a:tint val="97000"/>
+                <a:satMod val="95000"/>
+              </a:schemeClr>
+            </a:duotone>
+          </a:blip>
+          <a:tile tx="0" ty="0" sx="70000" sy="70000" flip="none" algn="tl"/>
+        </a:blipFill>
       </a:bgFillStyleLst>
     </a:fmtScheme>
   </a:themeElements>

</xml_diff>

<commit_message>
Se agregó la presentación de Parallel
</commit_message>
<xml_diff>
--- a/Tareas/JPPF/JPPF-Presentacion.pptx
+++ b/Tareas/JPPF/JPPF-Presentacion.pptx
@@ -16,7 +16,8 @@
     <p:sldId id="260" r:id="rId10"/>
     <p:sldId id="261" r:id="rId11"/>
     <p:sldId id="262" r:id="rId12"/>
-    <p:sldId id="263" r:id="rId13"/>
+    <p:sldId id="268" r:id="rId13"/>
+    <p:sldId id="263" r:id="rId14"/>
   </p:sldIdLst>
   <p:sldSz cx="9144000" cy="6858000" type="screen4x3"/>
   <p:notesSz cx="6858000" cy="9144000"/>
@@ -115,6 +116,22 @@
       </a:defRPr>
     </a:lvl9pPr>
   </p:defaultTextStyle>
+  <p:extLst>
+    <p:ext uri="{EFAFB233-063F-42B5-8137-9DF3F51BA10A}">
+      <p15:sldGuideLst xmlns:p15="http://schemas.microsoft.com/office/powerpoint/2012/main" xmlns="">
+        <p15:guide id="1" orient="horz" pos="2160">
+          <p15:clr>
+            <a:srgbClr val="A4A3A4"/>
+          </p15:clr>
+        </p15:guide>
+        <p15:guide id="2" pos="2880">
+          <p15:clr>
+            <a:srgbClr val="A4A3A4"/>
+          </p15:clr>
+        </p15:guide>
+      </p15:sldGuideLst>
+    </p:ext>
+  </p:extLst>
 </p:presentation>
 </file>
 
@@ -3656,6 +3673,38 @@
           <a:bodyPr/>
           <a:lstStyle/>
           <a:p>
+            <a:r>
+              <a:rPr lang="es-MX" dirty="0" smtClean="0"/>
+              <a:t>Cuando se agregan nodos en JPPF, lo primero que hace es identificarlos y mostrarlos en la topología, dependiendo del servidor en el cual se hayan conectado. Se muestra también su status y las tareas ejecutadas por el nodo.</a:t>
+            </a:r>
+          </a:p>
+          <a:p>
+            <a:r>
+              <a:rPr lang="es-MX" dirty="0" smtClean="0"/>
+              <a:t>Por su parte, cuando se inicializa un </a:t>
+            </a:r>
+            <a:r>
+              <a:rPr lang="es-MX" dirty="0" err="1" smtClean="0"/>
+              <a:t>job</a:t>
+            </a:r>
+            <a:r>
+              <a:rPr lang="es-MX" dirty="0" smtClean="0"/>
+              <a:t>, las </a:t>
+            </a:r>
+            <a:r>
+              <a:rPr lang="es-MX" dirty="0" err="1" smtClean="0"/>
+              <a:t>tasks</a:t>
+            </a:r>
+            <a:r>
+              <a:rPr lang="es-MX" dirty="0" smtClean="0"/>
+              <a:t> que contiene son divididas entre los nodos para lograr una ejecución mucho más rápida.</a:t>
+            </a:r>
+          </a:p>
+          <a:p>
+            <a:r>
+              <a:rPr lang="es-MX" dirty="0" smtClean="0"/>
+              <a:t>En caso de que el nodo se caiga en medio de la operación, las tareas restantes se redistribuyen entre los nodos activos.</a:t>
+            </a:r>
             <a:endParaRPr lang="es-MX" dirty="0"/>
           </a:p>
         </p:txBody>
@@ -3692,6 +3741,114 @@
       </p:grpSpPr>
       <p:sp>
         <p:nvSpPr>
+          <p:cNvPr id="2" name="Title 1"/>
+          <p:cNvSpPr>
+            <a:spLocks noGrp="1"/>
+          </p:cNvSpPr>
+          <p:nvPr>
+            <p:ph type="title"/>
+          </p:nvPr>
+        </p:nvSpPr>
+        <p:spPr/>
+        <p:txBody>
+          <a:bodyPr/>
+          <a:lstStyle/>
+          <a:p>
+            <a:endParaRPr lang="en-US"/>
+          </a:p>
+        </p:txBody>
+      </p:sp>
+      <p:pic>
+        <p:nvPicPr>
+          <p:cNvPr id="4" name="Content Placeholder 3"/>
+          <p:cNvPicPr>
+            <a:picLocks noGrp="1" noChangeAspect="1"/>
+          </p:cNvPicPr>
+          <p:nvPr>
+            <p:ph idx="1"/>
+          </p:nvPr>
+        </p:nvPicPr>
+        <p:blipFill>
+          <a:blip r:embed="rId2">
+            <a:extLst>
+              <a:ext uri="{28A0092B-C50C-407E-A947-70E740481C1C}">
+                <a14:useLocalDpi xmlns:a14="http://schemas.microsoft.com/office/drawing/2010/main" val="0"/>
+              </a:ext>
+            </a:extLst>
+          </a:blip>
+          <a:stretch>
+            <a:fillRect/>
+          </a:stretch>
+        </p:blipFill>
+        <p:spPr>
+          <a:xfrm>
+            <a:off x="0" y="0"/>
+            <a:ext cx="5393487" cy="4876800"/>
+          </a:xfrm>
+        </p:spPr>
+      </p:pic>
+      <p:pic>
+        <p:nvPicPr>
+          <p:cNvPr id="5" name="Picture 4"/>
+          <p:cNvPicPr>
+            <a:picLocks noChangeAspect="1"/>
+          </p:cNvPicPr>
+          <p:nvPr/>
+        </p:nvPicPr>
+        <p:blipFill>
+          <a:blip r:embed="rId3">
+            <a:extLst>
+              <a:ext uri="{28A0092B-C50C-407E-A947-70E740481C1C}">
+                <a14:useLocalDpi xmlns:a14="http://schemas.microsoft.com/office/drawing/2010/main" val="0"/>
+              </a:ext>
+            </a:extLst>
+          </a:blip>
+          <a:stretch>
+            <a:fillRect/>
+          </a:stretch>
+        </p:blipFill>
+        <p:spPr>
+          <a:xfrm>
+            <a:off x="1944380" y="1751887"/>
+            <a:ext cx="7182852" cy="5106113"/>
+          </a:xfrm>
+          <a:prstGeom prst="rect">
+            <a:avLst/>
+          </a:prstGeom>
+        </p:spPr>
+      </p:pic>
+    </p:spTree>
+    <p:extLst>
+      <p:ext uri="{BB962C8B-B14F-4D97-AF65-F5344CB8AC3E}">
+        <p14:creationId xmlns:p14="http://schemas.microsoft.com/office/powerpoint/2010/main" val="3756820509"/>
+      </p:ext>
+    </p:extLst>
+  </p:cSld>
+  <p:clrMapOvr>
+    <a:masterClrMapping/>
+  </p:clrMapOvr>
+</p:sld>
+</file>
+
+<file path=ppt/slides/slide13.xml><?xml version="1.0" encoding="utf-8"?>
+<p:sld xmlns:a="http://schemas.openxmlformats.org/drawingml/2006/main" xmlns:r="http://schemas.openxmlformats.org/officeDocument/2006/relationships" xmlns:p="http://schemas.openxmlformats.org/presentationml/2006/main">
+  <p:cSld>
+    <p:spTree>
+      <p:nvGrpSpPr>
+        <p:cNvPr id="1" name=""/>
+        <p:cNvGrpSpPr/>
+        <p:nvPr/>
+      </p:nvGrpSpPr>
+      <p:grpSpPr>
+        <a:xfrm>
+          <a:off x="0" y="0"/>
+          <a:ext cx="0" cy="0"/>
+          <a:chOff x="0" y="0"/>
+          <a:chExt cx="0" cy="0"/>
+        </a:xfrm>
+      </p:grpSpPr>
+      <p:sp>
+        <p:nvSpPr>
           <p:cNvPr id="2" name="1 Título"/>
           <p:cNvSpPr>
             <a:spLocks noGrp="1"/>
@@ -3715,25 +3872,35 @@
           </a:p>
         </p:txBody>
       </p:sp>
-      <p:sp>
-        <p:nvSpPr>
-          <p:cNvPr id="3" name="2 Marcador de contenido"/>
-          <p:cNvSpPr>
-            <a:spLocks noGrp="1"/>
-          </p:cNvSpPr>
+      <p:pic>
+        <p:nvPicPr>
+          <p:cNvPr id="4" name="3 Marcador de contenido"/>
+          <p:cNvPicPr>
+            <a:picLocks noGrp="1" noChangeAspect="1"/>
+          </p:cNvPicPr>
           <p:nvPr>
             <p:ph idx="1"/>
           </p:nvPr>
-        </p:nvSpPr>
-        <p:spPr/>
-        <p:txBody>
-          <a:bodyPr/>
-          <a:lstStyle/>
-          <a:p>
-            <a:endParaRPr lang="es-MX"/>
-          </a:p>
-        </p:txBody>
-      </p:sp>
+        </p:nvPicPr>
+        <p:blipFill>
+          <a:blip r:embed="rId2">
+            <a:extLst>
+              <a:ext uri="{28A0092B-C50C-407E-A947-70E740481C1C}">
+                <a14:useLocalDpi xmlns:a14="http://schemas.microsoft.com/office/drawing/2010/main" val="0"/>
+              </a:ext>
+            </a:extLst>
+          </a:blip>
+          <a:stretch>
+            <a:fillRect/>
+          </a:stretch>
+        </p:blipFill>
+        <p:spPr>
+          <a:xfrm>
+            <a:off x="2647681" y="1876123"/>
+            <a:ext cx="3848637" cy="4324954"/>
+          </a:xfrm>
+        </p:spPr>
+      </p:pic>
     </p:spTree>
     <p:extLst>
       <p:ext uri="{BB962C8B-B14F-4D97-AF65-F5344CB8AC3E}">
@@ -4594,15 +4761,7 @@
             </a:r>
             <a:r>
               <a:rPr lang="es-MX" dirty="0" smtClean="0"/>
-              <a:t> </a:t>
-            </a:r>
-            <a:r>
-              <a:rPr lang="es-MX" dirty="0" smtClean="0"/>
-              <a:t>excepcio</a:t>
-            </a:r>
-            <a:r>
-              <a:rPr lang="es-MX" dirty="0" smtClean="0"/>
-              <a:t>nes.</a:t>
+              <a:t> excepciones.</a:t>
             </a:r>
           </a:p>
           <a:p>
@@ -4653,11 +4812,7 @@
             </a:pPr>
             <a:r>
               <a:rPr lang="es-MX" dirty="0" smtClean="0"/>
-              <a:t>   a</a:t>
-            </a:r>
-            <a:r>
-              <a:rPr lang="es-MX" dirty="0" smtClean="0"/>
-              <a:t>sistente de instalación.</a:t>
+              <a:t>   asistente de instalación.</a:t>
             </a:r>
           </a:p>
           <a:p>

</xml_diff>